<commit_message>
newest version of ppt
</commit_message>
<xml_diff>
--- a/QA Automation.pptx
+++ b/QA Automation.pptx
@@ -17,18 +17,20 @@
     <p:sldId id="277" r:id="rId11"/>
     <p:sldId id="261" r:id="rId12"/>
     <p:sldId id="262" r:id="rId13"/>
-    <p:sldId id="263" r:id="rId14"/>
-    <p:sldId id="278" r:id="rId15"/>
-    <p:sldId id="266" r:id="rId16"/>
-    <p:sldId id="279" r:id="rId17"/>
-    <p:sldId id="267" r:id="rId18"/>
-    <p:sldId id="268" r:id="rId19"/>
-    <p:sldId id="269" r:id="rId20"/>
-    <p:sldId id="270" r:id="rId21"/>
-    <p:sldId id="272" r:id="rId22"/>
-    <p:sldId id="273" r:id="rId23"/>
-    <p:sldId id="274" r:id="rId24"/>
-    <p:sldId id="280" r:id="rId25"/>
+    <p:sldId id="280" r:id="rId14"/>
+    <p:sldId id="263" r:id="rId15"/>
+    <p:sldId id="281" r:id="rId16"/>
+    <p:sldId id="278" r:id="rId17"/>
+    <p:sldId id="266" r:id="rId18"/>
+    <p:sldId id="282" r:id="rId19"/>
+    <p:sldId id="279" r:id="rId20"/>
+    <p:sldId id="267" r:id="rId21"/>
+    <p:sldId id="268" r:id="rId22"/>
+    <p:sldId id="269" r:id="rId23"/>
+    <p:sldId id="270" r:id="rId24"/>
+    <p:sldId id="272" r:id="rId25"/>
+    <p:sldId id="273" r:id="rId26"/>
+    <p:sldId id="274" r:id="rId27"/>
   </p:sldIdLst>
   <p:sldSz cx="12192000" cy="6858000"/>
   <p:notesSz cx="6858000" cy="9144000"/>
@@ -8013,7 +8015,7 @@
       </dsp:nvSpPr>
       <dsp:spPr>
         <a:xfrm>
-          <a:off x="3611" y="831766"/>
+          <a:off x="3611" y="818727"/>
           <a:ext cx="2171301" cy="547200"/>
         </a:xfrm>
         <a:prstGeom prst="rect">
@@ -8079,7 +8081,7 @@
         </a:p>
       </dsp:txBody>
       <dsp:txXfrm>
-        <a:off x="3611" y="831766"/>
+        <a:off x="3611" y="818727"/>
         <a:ext cx="2171301" cy="547200"/>
       </dsp:txXfrm>
     </dsp:sp>
@@ -8090,8 +8092,8 @@
       </dsp:nvSpPr>
       <dsp:spPr>
         <a:xfrm>
-          <a:off x="3611" y="1378966"/>
-          <a:ext cx="2171301" cy="1512495"/>
+          <a:off x="3611" y="1365927"/>
+          <a:ext cx="2171301" cy="1538572"/>
         </a:xfrm>
         <a:prstGeom prst="rect">
           <a:avLst/>
@@ -8191,8 +8193,8 @@
         </a:p>
       </dsp:txBody>
       <dsp:txXfrm>
-        <a:off x="3611" y="1378966"/>
-        <a:ext cx="2171301" cy="1512495"/>
+        <a:off x="3611" y="1365927"/>
+        <a:ext cx="2171301" cy="1538572"/>
       </dsp:txXfrm>
     </dsp:sp>
     <dsp:sp modelId="{47BF6B33-728C-5C4B-A921-4F9CDACD122C}">
@@ -8202,7 +8204,7 @@
       </dsp:nvSpPr>
       <dsp:spPr>
         <a:xfrm>
-          <a:off x="2478894" y="831766"/>
+          <a:off x="2478894" y="818727"/>
           <a:ext cx="2171301" cy="547200"/>
         </a:xfrm>
         <a:prstGeom prst="rect">
@@ -8276,7 +8278,7 @@
         </a:p>
       </dsp:txBody>
       <dsp:txXfrm>
-        <a:off x="2478894" y="831766"/>
+        <a:off x="2478894" y="818727"/>
         <a:ext cx="2171301" cy="547200"/>
       </dsp:txXfrm>
     </dsp:sp>
@@ -8287,8 +8289,8 @@
       </dsp:nvSpPr>
       <dsp:spPr>
         <a:xfrm>
-          <a:off x="2478894" y="1378966"/>
-          <a:ext cx="2171301" cy="1512495"/>
+          <a:off x="2478894" y="1365927"/>
+          <a:ext cx="2171301" cy="1538572"/>
         </a:xfrm>
         <a:prstGeom prst="rect">
           <a:avLst/>
@@ -8388,8 +8390,8 @@
         </a:p>
       </dsp:txBody>
       <dsp:txXfrm>
-        <a:off x="2478894" y="1378966"/>
-        <a:ext cx="2171301" cy="1512495"/>
+        <a:off x="2478894" y="1365927"/>
+        <a:ext cx="2171301" cy="1538572"/>
       </dsp:txXfrm>
     </dsp:sp>
     <dsp:sp modelId="{2F10793A-3EB4-5441-8A4F-85A30723AB09}">
@@ -8399,7 +8401,7 @@
       </dsp:nvSpPr>
       <dsp:spPr>
         <a:xfrm>
-          <a:off x="4954178" y="831766"/>
+          <a:off x="4954178" y="818727"/>
           <a:ext cx="2171301" cy="547200"/>
         </a:xfrm>
         <a:prstGeom prst="rect">
@@ -8465,7 +8467,7 @@
         </a:p>
       </dsp:txBody>
       <dsp:txXfrm>
-        <a:off x="4954178" y="831766"/>
+        <a:off x="4954178" y="818727"/>
         <a:ext cx="2171301" cy="547200"/>
       </dsp:txXfrm>
     </dsp:sp>
@@ -8476,8 +8478,8 @@
       </dsp:nvSpPr>
       <dsp:spPr>
         <a:xfrm>
-          <a:off x="4954178" y="1378966"/>
-          <a:ext cx="2171301" cy="1512495"/>
+          <a:off x="4954178" y="1365927"/>
+          <a:ext cx="2171301" cy="1538572"/>
         </a:xfrm>
         <a:prstGeom prst="rect">
           <a:avLst/>
@@ -8577,8 +8579,8 @@
         </a:p>
       </dsp:txBody>
       <dsp:txXfrm>
-        <a:off x="4954178" y="1378966"/>
-        <a:ext cx="2171301" cy="1512495"/>
+        <a:off x="4954178" y="1365927"/>
+        <a:ext cx="2171301" cy="1538572"/>
       </dsp:txXfrm>
     </dsp:sp>
     <dsp:sp modelId="{3E9BB204-4C50-4940-9362-1C05694E6712}">
@@ -8588,7 +8590,7 @@
       </dsp:nvSpPr>
       <dsp:spPr>
         <a:xfrm>
-          <a:off x="7429462" y="831766"/>
+          <a:off x="7429462" y="818727"/>
           <a:ext cx="2171301" cy="547200"/>
         </a:xfrm>
         <a:prstGeom prst="rect">
@@ -8654,7 +8656,7 @@
         </a:p>
       </dsp:txBody>
       <dsp:txXfrm>
-        <a:off x="7429462" y="831766"/>
+        <a:off x="7429462" y="818727"/>
         <a:ext cx="2171301" cy="547200"/>
       </dsp:txXfrm>
     </dsp:sp>
@@ -8665,8 +8667,8 @@
       </dsp:nvSpPr>
       <dsp:spPr>
         <a:xfrm>
-          <a:off x="7429462" y="1378966"/>
-          <a:ext cx="2171301" cy="1512495"/>
+          <a:off x="7429462" y="1365927"/>
+          <a:ext cx="2171301" cy="1538572"/>
         </a:xfrm>
         <a:prstGeom prst="rect">
           <a:avLst/>
@@ -8761,8 +8763,8 @@
         </a:p>
       </dsp:txBody>
       <dsp:txXfrm>
-        <a:off x="7429462" y="1378966"/>
-        <a:ext cx="2171301" cy="1512495"/>
+        <a:off x="7429462" y="1365927"/>
+        <a:ext cx="2171301" cy="1538572"/>
       </dsp:txXfrm>
     </dsp:sp>
   </dsp:spTree>
@@ -15691,7 +15693,7 @@
           <a:p>
             <a:fld id="{556EC5F8-7B0E-C242-8464-A64B266D24E4}" type="datetimeFigureOut">
               <a:rPr lang="es-MX" smtClean="0"/>
-              <a:t>07/07/23</a:t>
+              <a:t>11/07/23</a:t>
             </a:fld>
             <a:endParaRPr lang="es-MX"/>
           </a:p>
@@ -15743,7 +15745,7 @@
           <a:p>
             <a:fld id="{EEA749B0-890E-8045-9AED-0FC8AF9C7DE4}" type="slidenum">
               <a:rPr lang="es-MX" smtClean="0"/>
-              <a:t>‹Nº›</a:t>
+              <a:t>‹#›</a:t>
             </a:fld>
             <a:endParaRPr lang="es-MX"/>
           </a:p>
@@ -15902,7 +15904,7 @@
           <a:p>
             <a:fld id="{556EC5F8-7B0E-C242-8464-A64B266D24E4}" type="datetimeFigureOut">
               <a:rPr lang="es-MX" smtClean="0"/>
-              <a:t>07/07/23</a:t>
+              <a:t>11/07/23</a:t>
             </a:fld>
             <a:endParaRPr lang="es-MX"/>
           </a:p>
@@ -15944,7 +15946,7 @@
           <a:p>
             <a:fld id="{EEA749B0-890E-8045-9AED-0FC8AF9C7DE4}" type="slidenum">
               <a:rPr lang="es-MX" smtClean="0"/>
-              <a:t>‹Nº›</a:t>
+              <a:t>‹#›</a:t>
             </a:fld>
             <a:endParaRPr lang="es-MX"/>
           </a:p>
@@ -16117,7 +16119,7 @@
           <a:p>
             <a:fld id="{556EC5F8-7B0E-C242-8464-A64B266D24E4}" type="datetimeFigureOut">
               <a:rPr lang="es-MX" smtClean="0"/>
-              <a:t>07/07/23</a:t>
+              <a:t>11/07/23</a:t>
             </a:fld>
             <a:endParaRPr lang="es-MX"/>
           </a:p>
@@ -16159,7 +16161,7 @@
           <a:p>
             <a:fld id="{EEA749B0-890E-8045-9AED-0FC8AF9C7DE4}" type="slidenum">
               <a:rPr lang="es-MX" smtClean="0"/>
-              <a:t>‹Nº›</a:t>
+              <a:t>‹#›</a:t>
             </a:fld>
             <a:endParaRPr lang="es-MX"/>
           </a:p>
@@ -16318,7 +16320,7 @@
           <a:p>
             <a:fld id="{556EC5F8-7B0E-C242-8464-A64B266D24E4}" type="datetimeFigureOut">
               <a:rPr lang="es-MX" smtClean="0"/>
-              <a:t>07/07/23</a:t>
+              <a:t>11/07/23</a:t>
             </a:fld>
             <a:endParaRPr lang="es-MX"/>
           </a:p>
@@ -16360,7 +16362,7 @@
           <a:p>
             <a:fld id="{EEA749B0-890E-8045-9AED-0FC8AF9C7DE4}" type="slidenum">
               <a:rPr lang="es-MX" smtClean="0"/>
-              <a:t>‹Nº›</a:t>
+              <a:t>‹#›</a:t>
             </a:fld>
             <a:endParaRPr lang="es-MX"/>
           </a:p>
@@ -16597,7 +16599,7 @@
           <a:p>
             <a:fld id="{556EC5F8-7B0E-C242-8464-A64B266D24E4}" type="datetimeFigureOut">
               <a:rPr lang="es-MX" smtClean="0"/>
-              <a:t>07/07/23</a:t>
+              <a:t>11/07/23</a:t>
             </a:fld>
             <a:endParaRPr lang="es-MX"/>
           </a:p>
@@ -16639,7 +16641,7 @@
           <a:p>
             <a:fld id="{EEA749B0-890E-8045-9AED-0FC8AF9C7DE4}" type="slidenum">
               <a:rPr lang="es-MX" smtClean="0"/>
-              <a:t>‹Nº›</a:t>
+              <a:t>‹#›</a:t>
             </a:fld>
             <a:endParaRPr lang="es-MX"/>
           </a:p>
@@ -16865,7 +16867,7 @@
           <a:p>
             <a:fld id="{556EC5F8-7B0E-C242-8464-A64B266D24E4}" type="datetimeFigureOut">
               <a:rPr lang="es-MX" smtClean="0"/>
-              <a:t>07/07/23</a:t>
+              <a:t>11/07/23</a:t>
             </a:fld>
             <a:endParaRPr lang="es-MX"/>
           </a:p>
@@ -16907,7 +16909,7 @@
           <a:p>
             <a:fld id="{EEA749B0-890E-8045-9AED-0FC8AF9C7DE4}" type="slidenum">
               <a:rPr lang="es-MX" smtClean="0"/>
-              <a:t>‹Nº›</a:t>
+              <a:t>‹#›</a:t>
             </a:fld>
             <a:endParaRPr lang="es-MX"/>
           </a:p>
@@ -17281,7 +17283,7 @@
           <a:p>
             <a:fld id="{556EC5F8-7B0E-C242-8464-A64B266D24E4}" type="datetimeFigureOut">
               <a:rPr lang="es-MX" smtClean="0"/>
-              <a:t>07/07/23</a:t>
+              <a:t>11/07/23</a:t>
             </a:fld>
             <a:endParaRPr lang="es-MX"/>
           </a:p>
@@ -17323,7 +17325,7 @@
           <a:p>
             <a:fld id="{EEA749B0-890E-8045-9AED-0FC8AF9C7DE4}" type="slidenum">
               <a:rPr lang="es-MX" smtClean="0"/>
-              <a:t>‹Nº›</a:t>
+              <a:t>‹#›</a:t>
             </a:fld>
             <a:endParaRPr lang="es-MX"/>
           </a:p>
@@ -17430,7 +17432,7 @@
           <a:p>
             <a:fld id="{556EC5F8-7B0E-C242-8464-A64B266D24E4}" type="datetimeFigureOut">
               <a:rPr lang="es-MX" smtClean="0"/>
-              <a:t>07/07/23</a:t>
+              <a:t>11/07/23</a:t>
             </a:fld>
             <a:endParaRPr lang="es-MX"/>
           </a:p>
@@ -17472,7 +17474,7 @@
           <a:p>
             <a:fld id="{EEA749B0-890E-8045-9AED-0FC8AF9C7DE4}" type="slidenum">
               <a:rPr lang="es-MX" smtClean="0"/>
-              <a:t>‹Nº›</a:t>
+              <a:t>‹#›</a:t>
             </a:fld>
             <a:endParaRPr lang="es-MX"/>
           </a:p>
@@ -17556,7 +17558,7 @@
           <a:p>
             <a:fld id="{556EC5F8-7B0E-C242-8464-A64B266D24E4}" type="datetimeFigureOut">
               <a:rPr lang="es-MX" smtClean="0"/>
-              <a:t>07/07/23</a:t>
+              <a:t>11/07/23</a:t>
             </a:fld>
             <a:endParaRPr lang="es-MX"/>
           </a:p>
@@ -17598,7 +17600,7 @@
           <a:p>
             <a:fld id="{EEA749B0-890E-8045-9AED-0FC8AF9C7DE4}" type="slidenum">
               <a:rPr lang="es-MX" smtClean="0"/>
-              <a:t>‹Nº›</a:t>
+              <a:t>‹#›</a:t>
             </a:fld>
             <a:endParaRPr lang="es-MX"/>
           </a:p>
@@ -17807,7 +17809,7 @@
           <a:p>
             <a:fld id="{556EC5F8-7B0E-C242-8464-A64B266D24E4}" type="datetimeFigureOut">
               <a:rPr lang="es-MX" smtClean="0"/>
-              <a:t>07/07/23</a:t>
+              <a:t>11/07/23</a:t>
             </a:fld>
             <a:endParaRPr lang="es-MX"/>
           </a:p>
@@ -17849,7 +17851,7 @@
           <a:p>
             <a:fld id="{EEA749B0-890E-8045-9AED-0FC8AF9C7DE4}" type="slidenum">
               <a:rPr lang="es-MX" smtClean="0"/>
-              <a:t>‹Nº›</a:t>
+              <a:t>‹#›</a:t>
             </a:fld>
             <a:endParaRPr lang="es-MX"/>
           </a:p>
@@ -18252,7 +18254,7 @@
           <a:p>
             <a:fld id="{556EC5F8-7B0E-C242-8464-A64B266D24E4}" type="datetimeFigureOut">
               <a:rPr lang="es-MX" smtClean="0"/>
-              <a:t>07/07/23</a:t>
+              <a:t>11/07/23</a:t>
             </a:fld>
             <a:endParaRPr lang="es-MX"/>
           </a:p>
@@ -18299,7 +18301,7 @@
           <a:p>
             <a:fld id="{EEA749B0-890E-8045-9AED-0FC8AF9C7DE4}" type="slidenum">
               <a:rPr lang="es-MX" smtClean="0"/>
-              <a:t>‹Nº›</a:t>
+              <a:t>‹#›</a:t>
             </a:fld>
             <a:endParaRPr lang="es-MX"/>
           </a:p>
@@ -18579,7 +18581,7 @@
           <a:p>
             <a:fld id="{556EC5F8-7B0E-C242-8464-A64B266D24E4}" type="datetimeFigureOut">
               <a:rPr lang="es-MX" smtClean="0"/>
-              <a:t>07/07/23</a:t>
+              <a:t>11/07/23</a:t>
             </a:fld>
             <a:endParaRPr lang="es-MX"/>
           </a:p>
@@ -18655,7 +18657,7 @@
           <a:p>
             <a:fld id="{EEA749B0-890E-8045-9AED-0FC8AF9C7DE4}" type="slidenum">
               <a:rPr lang="es-MX" smtClean="0"/>
-              <a:t>‹Nº›</a:t>
+              <a:t>‹#›</a:t>
             </a:fld>
             <a:endParaRPr lang="es-MX"/>
           </a:p>
@@ -21566,6 +21568,626 @@
           <a:chExt cx="0" cy="0"/>
         </a:xfrm>
       </p:grpSpPr>
+      <p:sp>
+        <p:nvSpPr>
+          <p:cNvPr id="10" name="Rectangle 9">
+            <a:extLst>
+              <a:ext uri="{FF2B5EF4-FFF2-40B4-BE49-F238E27FC236}">
+                <a16:creationId xmlns:a16="http://schemas.microsoft.com/office/drawing/2014/main" id="{0CABCAE3-64FC-4149-819F-2C1812824154}"/>
+              </a:ext>
+              <a:ext uri="{C183D7F6-B498-43B3-948B-1728B52AA6E4}">
+                <adec:decorative xmlns:adec="http://schemas.microsoft.com/office/drawing/2017/decorative" val="1"/>
+              </a:ext>
+            </a:extLst>
+          </p:cNvPr>
+          <p:cNvSpPr>
+            <a:spLocks noGrp="1" noRot="1" noChangeAspect="1" noMove="1" noResize="1" noEditPoints="1" noAdjustHandles="1" noChangeArrowheads="1" noChangeShapeType="1" noTextEdit="1"/>
+          </p:cNvSpPr>
+          <p:nvPr>
+            <p:extLst>
+              <p:ext uri="{386F3935-93C4-4BCD-93E2-E3B085C9AB24}">
+                <p16:designElem xmlns:p16="http://schemas.microsoft.com/office/powerpoint/2015/main" val="1"/>
+              </p:ext>
+            </p:extLst>
+          </p:nvPr>
+        </p:nvSpPr>
+        <p:spPr>
+          <a:xfrm>
+            <a:off x="0" y="2019476"/>
+            <a:ext cx="12192000" cy="4105941"/>
+          </a:xfrm>
+          <a:prstGeom prst="rect">
+            <a:avLst/>
+          </a:prstGeom>
+          <a:gradFill flip="none" rotWithShape="1">
+            <a:gsLst>
+              <a:gs pos="0">
+                <a:schemeClr val="bg2">
+                  <a:alpha val="0"/>
+                </a:schemeClr>
+              </a:gs>
+              <a:gs pos="100000">
+                <a:schemeClr val="bg2"/>
+              </a:gs>
+            </a:gsLst>
+            <a:lin ang="5400000" scaled="0"/>
+            <a:tileRect/>
+          </a:gradFill>
+          <a:ln>
+            <a:noFill/>
+          </a:ln>
+        </p:spPr>
+        <p:style>
+          <a:lnRef idx="2">
+            <a:schemeClr val="accent1">
+              <a:shade val="50000"/>
+            </a:schemeClr>
+          </a:lnRef>
+          <a:fillRef idx="1">
+            <a:schemeClr val="accent1"/>
+          </a:fillRef>
+          <a:effectRef idx="0">
+            <a:schemeClr val="accent1"/>
+          </a:effectRef>
+          <a:fontRef idx="minor">
+            <a:schemeClr val="lt1"/>
+          </a:fontRef>
+        </p:style>
+      </p:sp>
+      <p:pic>
+        <p:nvPicPr>
+          <p:cNvPr id="12" name="Picture 11">
+            <a:extLst>
+              <a:ext uri="{FF2B5EF4-FFF2-40B4-BE49-F238E27FC236}">
+                <a16:creationId xmlns:a16="http://schemas.microsoft.com/office/drawing/2014/main" id="{012FDCFE-9AD2-4D8A-8CBF-B3AA37EBF6DD}"/>
+              </a:ext>
+              <a:ext uri="{C183D7F6-B498-43B3-948B-1728B52AA6E4}">
+                <adec:decorative xmlns:adec="http://schemas.microsoft.com/office/drawing/2017/decorative" val="1"/>
+              </a:ext>
+            </a:extLst>
+          </p:cNvPr>
+          <p:cNvPicPr>
+            <a:picLocks noGrp="1" noRot="1" noChangeAspect="1" noMove="1" noResize="1" noEditPoints="1" noAdjustHandles="1" noChangeArrowheads="1" noChangeShapeType="1" noCrop="1"/>
+          </p:cNvPicPr>
+          <p:nvPr>
+            <p:extLst>
+              <p:ext uri="{386F3935-93C4-4BCD-93E2-E3B085C9AB24}">
+                <p16:designElem xmlns:p16="http://schemas.microsoft.com/office/powerpoint/2015/main" val="1"/>
+              </p:ext>
+            </p:extLst>
+          </p:nvPr>
+        </p:nvPicPr>
+        <p:blipFill rotWithShape="1">
+          <a:blip r:embed="rId2">
+            <a:extLst>
+              <a:ext uri="{28A0092B-C50C-407E-A947-70E740481C1C}">
+                <a14:useLocalDpi xmlns:a14="http://schemas.microsoft.com/office/drawing/2010/main" val="0"/>
+              </a:ext>
+            </a:extLst>
+          </a:blip>
+          <a:srcRect t="1538" b="-1538"/>
+          <a:stretch/>
+        </p:blipFill>
+        <p:spPr bwMode="black">
+          <a:xfrm>
+            <a:off x="0" y="6126480"/>
+            <a:ext cx="12192000" cy="742950"/>
+          </a:xfrm>
+          <a:prstGeom prst="rect">
+            <a:avLst/>
+          </a:prstGeom>
+        </p:spPr>
+      </p:pic>
+      <p:cxnSp>
+        <p:nvCxnSpPr>
+          <p:cNvPr id="14" name="Straight Connector 13">
+            <a:extLst>
+              <a:ext uri="{FF2B5EF4-FFF2-40B4-BE49-F238E27FC236}">
+                <a16:creationId xmlns:a16="http://schemas.microsoft.com/office/drawing/2014/main" id="{FBD463FC-4CA8-4FF4-85A3-AF9F4B98D210}"/>
+              </a:ext>
+              <a:ext uri="{C183D7F6-B498-43B3-948B-1728B52AA6E4}">
+                <adec:decorative xmlns:adec="http://schemas.microsoft.com/office/drawing/2017/decorative" val="1"/>
+              </a:ext>
+            </a:extLst>
+          </p:cNvPr>
+          <p:cNvCxnSpPr>
+            <a:cxnSpLocks noGrp="1" noRot="1" noChangeAspect="1" noMove="1" noResize="1" noEditPoints="1" noAdjustHandles="1" noChangeArrowheads="1" noChangeShapeType="1"/>
+          </p:cNvCxnSpPr>
+          <p:nvPr>
+            <p:extLst>
+              <p:ext uri="{386F3935-93C4-4BCD-93E2-E3B085C9AB24}">
+                <p16:designElem xmlns:p16="http://schemas.microsoft.com/office/powerpoint/2015/main" val="1"/>
+              </p:ext>
+            </p:extLst>
+          </p:nvPr>
+        </p:nvCxnSpPr>
+        <p:spPr>
+          <a:xfrm>
+            <a:off x="0" y="6128413"/>
+            <a:ext cx="12192000" cy="0"/>
+          </a:xfrm>
+          <a:prstGeom prst="line">
+            <a:avLst/>
+          </a:prstGeom>
+          <a:ln w="12700">
+            <a:solidFill>
+              <a:srgbClr val="000001">
+                <a:alpha val="20000"/>
+              </a:srgbClr>
+            </a:solidFill>
+          </a:ln>
+        </p:spPr>
+        <p:style>
+          <a:lnRef idx="1">
+            <a:schemeClr val="accent1"/>
+          </a:lnRef>
+          <a:fillRef idx="0">
+            <a:schemeClr val="accent1"/>
+          </a:fillRef>
+          <a:effectRef idx="0">
+            <a:schemeClr val="accent1"/>
+          </a:effectRef>
+          <a:fontRef idx="minor">
+            <a:schemeClr val="tx1"/>
+          </a:fontRef>
+        </p:style>
+      </p:cxnSp>
+      <p:cxnSp>
+        <p:nvCxnSpPr>
+          <p:cNvPr id="16" name="Straight Connector 15">
+            <a:extLst>
+              <a:ext uri="{FF2B5EF4-FFF2-40B4-BE49-F238E27FC236}">
+                <a16:creationId xmlns:a16="http://schemas.microsoft.com/office/drawing/2014/main" id="{BECF35C3-8B44-4F4B-BD25-4C01823DB22A}"/>
+              </a:ext>
+              <a:ext uri="{C183D7F6-B498-43B3-948B-1728B52AA6E4}">
+                <adec:decorative xmlns:adec="http://schemas.microsoft.com/office/drawing/2017/decorative" val="1"/>
+              </a:ext>
+            </a:extLst>
+          </p:cNvPr>
+          <p:cNvCxnSpPr>
+            <a:cxnSpLocks noGrp="1" noRot="1" noChangeAspect="1" noMove="1" noResize="1" noEditPoints="1" noAdjustHandles="1" noChangeArrowheads="1" noChangeShapeType="1"/>
+          </p:cNvCxnSpPr>
+          <p:nvPr>
+            <p:extLst>
+              <p:ext uri="{386F3935-93C4-4BCD-93E2-E3B085C9AB24}">
+                <p16:designElem xmlns:p16="http://schemas.microsoft.com/office/powerpoint/2015/main" val="1"/>
+              </p:ext>
+            </p:extLst>
+          </p:nvPr>
+        </p:nvCxnSpPr>
+        <p:spPr>
+          <a:xfrm>
+            <a:off x="2417780" y="3528542"/>
+            <a:ext cx="8637072" cy="0"/>
+          </a:xfrm>
+          <a:prstGeom prst="line">
+            <a:avLst/>
+          </a:prstGeom>
+          <a:ln w="31750"/>
+        </p:spPr>
+        <p:style>
+          <a:lnRef idx="3">
+            <a:schemeClr val="accent1"/>
+          </a:lnRef>
+          <a:fillRef idx="0">
+            <a:schemeClr val="accent1"/>
+          </a:fillRef>
+          <a:effectRef idx="2">
+            <a:schemeClr val="accent1"/>
+          </a:effectRef>
+          <a:fontRef idx="minor">
+            <a:schemeClr val="tx1"/>
+          </a:fontRef>
+        </p:style>
+      </p:cxnSp>
+      <p:sp useBgFill="1">
+        <p:nvSpPr>
+          <p:cNvPr id="18" name="Rectangle 17">
+            <a:extLst>
+              <a:ext uri="{FF2B5EF4-FFF2-40B4-BE49-F238E27FC236}">
+                <a16:creationId xmlns:a16="http://schemas.microsoft.com/office/drawing/2014/main" id="{D0712110-0BC1-4B31-B3BB-63B44222E87F}"/>
+              </a:ext>
+              <a:ext uri="{C183D7F6-B498-43B3-948B-1728B52AA6E4}">
+                <adec:decorative xmlns:adec="http://schemas.microsoft.com/office/drawing/2017/decorative" val="1"/>
+              </a:ext>
+            </a:extLst>
+          </p:cNvPr>
+          <p:cNvSpPr>
+            <a:spLocks noGrp="1" noRot="1" noChangeAspect="1" noMove="1" noResize="1" noEditPoints="1" noAdjustHandles="1" noChangeArrowheads="1" noChangeShapeType="1" noTextEdit="1"/>
+          </p:cNvSpPr>
+          <p:nvPr>
+            <p:extLst>
+              <p:ext uri="{386F3935-93C4-4BCD-93E2-E3B085C9AB24}">
+                <p16:designElem xmlns:p16="http://schemas.microsoft.com/office/powerpoint/2015/main" val="1"/>
+              </p:ext>
+            </p:extLst>
+          </p:nvPr>
+        </p:nvSpPr>
+        <p:spPr>
+          <a:xfrm>
+            <a:off x="2" y="0"/>
+            <a:ext cx="12191695" cy="6858000"/>
+          </a:xfrm>
+          <a:prstGeom prst="rect">
+            <a:avLst/>
+          </a:prstGeom>
+          <a:ln>
+            <a:noFill/>
+          </a:ln>
+        </p:spPr>
+        <p:style>
+          <a:lnRef idx="2">
+            <a:schemeClr val="accent1">
+              <a:shade val="50000"/>
+            </a:schemeClr>
+          </a:lnRef>
+          <a:fillRef idx="1">
+            <a:schemeClr val="accent1"/>
+          </a:fillRef>
+          <a:effectRef idx="0">
+            <a:schemeClr val="accent1"/>
+          </a:effectRef>
+          <a:fontRef idx="minor">
+            <a:schemeClr val="lt1"/>
+          </a:fontRef>
+        </p:style>
+        <p:txBody>
+          <a:bodyPr rtlCol="0" anchor="ctr"/>
+          <a:lstStyle/>
+          <a:p>
+            <a:pPr algn="ctr"/>
+            <a:endParaRPr lang="en-US"/>
+          </a:p>
+        </p:txBody>
+      </p:sp>
+      <p:sp>
+        <p:nvSpPr>
+          <p:cNvPr id="20" name="Rectangle 19">
+            <a:extLst>
+              <a:ext uri="{FF2B5EF4-FFF2-40B4-BE49-F238E27FC236}">
+                <a16:creationId xmlns:a16="http://schemas.microsoft.com/office/drawing/2014/main" id="{4466B5F3-C053-4580-B04A-1EF949888280}"/>
+              </a:ext>
+              <a:ext uri="{C183D7F6-B498-43B3-948B-1728B52AA6E4}">
+                <adec:decorative xmlns:adec="http://schemas.microsoft.com/office/drawing/2017/decorative" val="1"/>
+              </a:ext>
+            </a:extLst>
+          </p:cNvPr>
+          <p:cNvSpPr>
+            <a:spLocks noGrp="1" noRot="1" noChangeAspect="1" noMove="1" noResize="1" noEditPoints="1" noAdjustHandles="1" noChangeArrowheads="1" noChangeShapeType="1" noTextEdit="1"/>
+          </p:cNvSpPr>
+          <p:nvPr>
+            <p:extLst>
+              <p:ext uri="{386F3935-93C4-4BCD-93E2-E3B085C9AB24}">
+                <p16:designElem xmlns:p16="http://schemas.microsoft.com/office/powerpoint/2015/main" val="1"/>
+              </p:ext>
+            </p:extLst>
+          </p:nvPr>
+        </p:nvSpPr>
+        <p:spPr>
+          <a:xfrm>
+            <a:off x="0" y="2019476"/>
+            <a:ext cx="12192000" cy="4105941"/>
+          </a:xfrm>
+          <a:prstGeom prst="rect">
+            <a:avLst/>
+          </a:prstGeom>
+          <a:gradFill flip="none" rotWithShape="1">
+            <a:gsLst>
+              <a:gs pos="0">
+                <a:schemeClr val="bg2">
+                  <a:alpha val="0"/>
+                </a:schemeClr>
+              </a:gs>
+              <a:gs pos="100000">
+                <a:schemeClr val="bg2"/>
+              </a:gs>
+            </a:gsLst>
+            <a:lin ang="5400000" scaled="0"/>
+            <a:tileRect/>
+          </a:gradFill>
+          <a:ln>
+            <a:noFill/>
+          </a:ln>
+        </p:spPr>
+        <p:style>
+          <a:lnRef idx="2">
+            <a:schemeClr val="accent1">
+              <a:shade val="50000"/>
+            </a:schemeClr>
+          </a:lnRef>
+          <a:fillRef idx="1">
+            <a:schemeClr val="accent1"/>
+          </a:fillRef>
+          <a:effectRef idx="0">
+            <a:schemeClr val="accent1"/>
+          </a:effectRef>
+          <a:fontRef idx="minor">
+            <a:schemeClr val="lt1"/>
+          </a:fontRef>
+        </p:style>
+        <p:txBody>
+          <a:bodyPr rtlCol="0" anchor="ctr"/>
+          <a:lstStyle/>
+          <a:p>
+            <a:pPr lvl="0" algn="ctr"/>
+            <a:endParaRPr lang="en-US"/>
+          </a:p>
+        </p:txBody>
+      </p:sp>
+      <p:sp>
+        <p:nvSpPr>
+          <p:cNvPr id="2" name="Title 1">
+            <a:extLst>
+              <a:ext uri="{FF2B5EF4-FFF2-40B4-BE49-F238E27FC236}">
+                <a16:creationId xmlns:a16="http://schemas.microsoft.com/office/drawing/2014/main" id="{DA5A10AA-6140-5313-7D9C-4B444460DF7C}"/>
+              </a:ext>
+            </a:extLst>
+          </p:cNvPr>
+          <p:cNvSpPr>
+            <a:spLocks noGrp="1"/>
+          </p:cNvSpPr>
+          <p:nvPr>
+            <p:ph type="title"/>
+          </p:nvPr>
+        </p:nvSpPr>
+        <p:spPr>
+          <a:xfrm>
+            <a:off x="1452616" y="962902"/>
+            <a:ext cx="4176384" cy="2380828"/>
+          </a:xfrm>
+        </p:spPr>
+        <p:txBody>
+          <a:bodyPr vert="horz" lIns="91440" tIns="45720" rIns="91440" bIns="0" rtlCol="0" anchor="b">
+            <a:normAutofit/>
+          </a:bodyPr>
+          <a:lstStyle/>
+          <a:p>
+            <a:r>
+              <a:rPr lang="en-US" sz="4800"/>
+              <a:t>Niveles de Testing</a:t>
+            </a:r>
+          </a:p>
+        </p:txBody>
+      </p:sp>
+      <p:cxnSp>
+        <p:nvCxnSpPr>
+          <p:cNvPr id="22" name="Straight Connector 21">
+            <a:extLst>
+              <a:ext uri="{FF2B5EF4-FFF2-40B4-BE49-F238E27FC236}">
+                <a16:creationId xmlns:a16="http://schemas.microsoft.com/office/drawing/2014/main" id="{FA6123F2-4B61-414F-A7E5-5B7828EACAE2}"/>
+              </a:ext>
+              <a:ext uri="{C183D7F6-B498-43B3-948B-1728B52AA6E4}">
+                <adec:decorative xmlns:adec="http://schemas.microsoft.com/office/drawing/2017/decorative" val="1"/>
+              </a:ext>
+            </a:extLst>
+          </p:cNvPr>
+          <p:cNvCxnSpPr>
+            <a:cxnSpLocks noGrp="1" noRot="1" noChangeAspect="1" noMove="1" noResize="1" noEditPoints="1" noAdjustHandles="1" noChangeArrowheads="1" noChangeShapeType="1"/>
+          </p:cNvCxnSpPr>
+          <p:nvPr>
+            <p:extLst>
+              <p:ext uri="{386F3935-93C4-4BCD-93E2-E3B085C9AB24}">
+                <p16:designElem xmlns:p16="http://schemas.microsoft.com/office/powerpoint/2015/main" val="1"/>
+              </p:ext>
+            </p:extLst>
+          </p:nvPr>
+        </p:nvCxnSpPr>
+        <p:spPr>
+          <a:xfrm>
+            <a:off x="1452617" y="3528543"/>
+            <a:ext cx="4171479" cy="0"/>
+          </a:xfrm>
+          <a:prstGeom prst="line">
+            <a:avLst/>
+          </a:prstGeom>
+          <a:ln w="31750"/>
+        </p:spPr>
+        <p:style>
+          <a:lnRef idx="3">
+            <a:schemeClr val="accent1"/>
+          </a:lnRef>
+          <a:fillRef idx="0">
+            <a:schemeClr val="accent1"/>
+          </a:fillRef>
+          <a:effectRef idx="2">
+            <a:schemeClr val="accent1"/>
+          </a:effectRef>
+          <a:fontRef idx="minor">
+            <a:schemeClr val="tx1"/>
+          </a:fontRef>
+        </p:style>
+      </p:cxnSp>
+      <p:pic>
+        <p:nvPicPr>
+          <p:cNvPr id="7" name="Graphic 6" descr="Test tubes">
+            <a:extLst>
+              <a:ext uri="{FF2B5EF4-FFF2-40B4-BE49-F238E27FC236}">
+                <a16:creationId xmlns:a16="http://schemas.microsoft.com/office/drawing/2014/main" id="{72A6C2BB-5C63-2735-1699-8CCFA218F7A3}"/>
+              </a:ext>
+            </a:extLst>
+          </p:cNvPr>
+          <p:cNvPicPr>
+            <a:picLocks noChangeAspect="1"/>
+          </p:cNvPicPr>
+          <p:nvPr/>
+        </p:nvPicPr>
+        <p:blipFill>
+          <a:blip r:embed="rId3">
+            <a:extLst>
+              <a:ext uri="{28A0092B-C50C-407E-A947-70E740481C1C}">
+                <a14:useLocalDpi xmlns:a14="http://schemas.microsoft.com/office/drawing/2010/main" val="0"/>
+              </a:ext>
+              <a:ext uri="{96DAC541-7B7A-43D3-8B79-37D633B846F1}">
+                <asvg:svgBlip xmlns:asvg="http://schemas.microsoft.com/office/drawing/2016/SVG/main" r:embed="rId4"/>
+              </a:ext>
+            </a:extLst>
+          </a:blip>
+          <a:stretch>
+            <a:fillRect/>
+          </a:stretch>
+        </p:blipFill>
+        <p:spPr>
+          <a:xfrm>
+            <a:off x="6244251" y="805583"/>
+            <a:ext cx="4660762" cy="4660762"/>
+          </a:xfrm>
+          <a:prstGeom prst="rect">
+            <a:avLst/>
+          </a:prstGeom>
+        </p:spPr>
+      </p:pic>
+      <p:pic>
+        <p:nvPicPr>
+          <p:cNvPr id="24" name="Picture 23">
+            <a:extLst>
+              <a:ext uri="{FF2B5EF4-FFF2-40B4-BE49-F238E27FC236}">
+                <a16:creationId xmlns:a16="http://schemas.microsoft.com/office/drawing/2014/main" id="{25CED634-E2D0-4AB7-96DD-816C9B52C5CF}"/>
+              </a:ext>
+              <a:ext uri="{C183D7F6-B498-43B3-948B-1728B52AA6E4}">
+                <adec:decorative xmlns:adec="http://schemas.microsoft.com/office/drawing/2017/decorative" val="1"/>
+              </a:ext>
+            </a:extLst>
+          </p:cNvPr>
+          <p:cNvPicPr>
+            <a:picLocks noGrp="1" noRot="1" noChangeAspect="1" noMove="1" noResize="1" noEditPoints="1" noAdjustHandles="1" noChangeArrowheads="1" noChangeShapeType="1" noCrop="1"/>
+          </p:cNvPicPr>
+          <p:nvPr>
+            <p:extLst>
+              <p:ext uri="{386F3935-93C4-4BCD-93E2-E3B085C9AB24}">
+                <p16:designElem xmlns:p16="http://schemas.microsoft.com/office/powerpoint/2015/main" val="1"/>
+              </p:ext>
+            </p:extLst>
+          </p:nvPr>
+        </p:nvPicPr>
+        <p:blipFill rotWithShape="1">
+          <a:blip r:embed="rId2">
+            <a:extLst>
+              <a:ext uri="{28A0092B-C50C-407E-A947-70E740481C1C}">
+                <a14:useLocalDpi xmlns:a14="http://schemas.microsoft.com/office/drawing/2010/main" val="0"/>
+              </a:ext>
+            </a:extLst>
+          </a:blip>
+          <a:srcRect t="1538" b="-1538"/>
+          <a:stretch/>
+        </p:blipFill>
+        <p:spPr bwMode="black">
+          <a:xfrm>
+            <a:off x="0" y="6126480"/>
+            <a:ext cx="12192000" cy="742950"/>
+          </a:xfrm>
+          <a:prstGeom prst="rect">
+            <a:avLst/>
+          </a:prstGeom>
+        </p:spPr>
+      </p:pic>
+      <p:cxnSp>
+        <p:nvCxnSpPr>
+          <p:cNvPr id="26" name="Straight Connector 25">
+            <a:extLst>
+              <a:ext uri="{FF2B5EF4-FFF2-40B4-BE49-F238E27FC236}">
+                <a16:creationId xmlns:a16="http://schemas.microsoft.com/office/drawing/2014/main" id="{FCDDCDFB-696D-4FDF-9B58-24F71B7C37BC}"/>
+              </a:ext>
+              <a:ext uri="{C183D7F6-B498-43B3-948B-1728B52AA6E4}">
+                <adec:decorative xmlns:adec="http://schemas.microsoft.com/office/drawing/2017/decorative" val="1"/>
+              </a:ext>
+            </a:extLst>
+          </p:cNvPr>
+          <p:cNvCxnSpPr>
+            <a:cxnSpLocks noGrp="1" noRot="1" noChangeAspect="1" noMove="1" noResize="1" noEditPoints="1" noAdjustHandles="1" noChangeArrowheads="1" noChangeShapeType="1"/>
+          </p:cNvCxnSpPr>
+          <p:nvPr>
+            <p:extLst>
+              <p:ext uri="{386F3935-93C4-4BCD-93E2-E3B085C9AB24}">
+                <p16:designElem xmlns:p16="http://schemas.microsoft.com/office/powerpoint/2015/main" val="1"/>
+              </p:ext>
+            </p:extLst>
+          </p:nvPr>
+        </p:nvCxnSpPr>
+        <p:spPr>
+          <a:xfrm>
+            <a:off x="0" y="6128413"/>
+            <a:ext cx="12192000" cy="0"/>
+          </a:xfrm>
+          <a:prstGeom prst="line">
+            <a:avLst/>
+          </a:prstGeom>
+          <a:ln w="12700">
+            <a:solidFill>
+              <a:srgbClr val="000001">
+                <a:alpha val="20000"/>
+              </a:srgbClr>
+            </a:solidFill>
+          </a:ln>
+        </p:spPr>
+        <p:style>
+          <a:lnRef idx="1">
+            <a:schemeClr val="accent1"/>
+          </a:lnRef>
+          <a:fillRef idx="0">
+            <a:schemeClr val="accent1"/>
+          </a:fillRef>
+          <a:effectRef idx="0">
+            <a:schemeClr val="accent1"/>
+          </a:effectRef>
+          <a:fontRef idx="minor">
+            <a:schemeClr val="tx1"/>
+          </a:fontRef>
+        </p:style>
+      </p:cxnSp>
+    </p:spTree>
+    <p:extLst>
+      <p:ext uri="{BB962C8B-B14F-4D97-AF65-F5344CB8AC3E}">
+        <p14:creationId xmlns:p14="http://schemas.microsoft.com/office/powerpoint/2010/main" val="2789975023"/>
+      </p:ext>
+    </p:extLst>
+  </p:cSld>
+  <p:clrMapOvr>
+    <a:masterClrMapping/>
+  </p:clrMapOvr>
+</p:sld>
+</file>
+
+<file path=ppt/slides/slide14.xml><?xml version="1.0" encoding="utf-8"?>
+<p:sld xmlns:a="http://schemas.openxmlformats.org/drawingml/2006/main" xmlns:r="http://schemas.openxmlformats.org/officeDocument/2006/relationships" xmlns:p="http://schemas.openxmlformats.org/presentationml/2006/main">
+  <p:cSld>
+    <p:bg>
+      <p:bgPr>
+        <a:gradFill rotWithShape="1">
+          <a:gsLst>
+            <a:gs pos="0">
+              <a:schemeClr val="bg2">
+                <a:tint val="94000"/>
+                <a:satMod val="80000"/>
+                <a:lumMod val="106000"/>
+              </a:schemeClr>
+            </a:gs>
+            <a:gs pos="100000">
+              <a:schemeClr val="bg2">
+                <a:shade val="80000"/>
+              </a:schemeClr>
+            </a:gs>
+          </a:gsLst>
+          <a:path path="circle">
+            <a:fillToRect l="43000" r="43000" b="100000"/>
+          </a:path>
+        </a:gradFill>
+        <a:effectLst/>
+      </p:bgPr>
+    </p:bg>
+    <p:spTree>
+      <p:nvGrpSpPr>
+        <p:cNvPr id="1" name=""/>
+        <p:cNvGrpSpPr/>
+        <p:nvPr/>
+      </p:nvGrpSpPr>
+      <p:grpSpPr>
+        <a:xfrm>
+          <a:off x="0" y="0"/>
+          <a:ext cx="0" cy="0"/>
+          <a:chOff x="0" y="0"/>
+          <a:chExt cx="0" cy="0"/>
+        </a:xfrm>
+      </p:grpSpPr>
       <p:sp useBgFill="1">
         <p:nvSpPr>
           <p:cNvPr id="9" name="Rectangle 8">
@@ -21986,7 +22608,115 @@
 </p:sld>
 </file>
 
-<file path=ppt/slides/slide14.xml><?xml version="1.0" encoding="utf-8"?>
+<file path=ppt/slides/slide15.xml><?xml version="1.0" encoding="utf-8"?>
+<p:sld xmlns:a="http://schemas.openxmlformats.org/drawingml/2006/main" xmlns:r="http://schemas.openxmlformats.org/officeDocument/2006/relationships" xmlns:p="http://schemas.openxmlformats.org/presentationml/2006/main">
+  <p:cSld>
+    <p:spTree>
+      <p:nvGrpSpPr>
+        <p:cNvPr id="1" name=""/>
+        <p:cNvGrpSpPr/>
+        <p:nvPr/>
+      </p:nvGrpSpPr>
+      <p:grpSpPr>
+        <a:xfrm>
+          <a:off x="0" y="0"/>
+          <a:ext cx="0" cy="0"/>
+          <a:chOff x="0" y="0"/>
+          <a:chExt cx="0" cy="0"/>
+        </a:xfrm>
+      </p:grpSpPr>
+      <p:sp>
+        <p:nvSpPr>
+          <p:cNvPr id="2" name="Title 1">
+            <a:extLst>
+              <a:ext uri="{FF2B5EF4-FFF2-40B4-BE49-F238E27FC236}">
+                <a16:creationId xmlns:a16="http://schemas.microsoft.com/office/drawing/2014/main" id="{DA5A10AA-6140-5313-7D9C-4B444460DF7C}"/>
+              </a:ext>
+            </a:extLst>
+          </p:cNvPr>
+          <p:cNvSpPr>
+            <a:spLocks noGrp="1"/>
+          </p:cNvSpPr>
+          <p:nvPr>
+            <p:ph type="title"/>
+          </p:nvPr>
+        </p:nvSpPr>
+        <p:spPr>
+          <a:xfrm>
+            <a:off x="1452616" y="962902"/>
+            <a:ext cx="4176384" cy="2380828"/>
+          </a:xfrm>
+        </p:spPr>
+        <p:txBody>
+          <a:bodyPr vert="horz" lIns="91440" tIns="45720" rIns="91440" bIns="0" rtlCol="0" anchor="b">
+            <a:normAutofit/>
+          </a:bodyPr>
+          <a:lstStyle/>
+          <a:p>
+            <a:r>
+              <a:rPr lang="en-US" sz="4800" dirty="0" err="1"/>
+              <a:t>Tipos</a:t>
+            </a:r>
+            <a:r>
+              <a:rPr lang="en-US" sz="4800" dirty="0"/>
+              <a:t> de Testing</a:t>
+            </a:r>
+          </a:p>
+        </p:txBody>
+      </p:sp>
+      <p:pic>
+        <p:nvPicPr>
+          <p:cNvPr id="7" name="Graphic 6" descr="Test tubes">
+            <a:extLst>
+              <a:ext uri="{FF2B5EF4-FFF2-40B4-BE49-F238E27FC236}">
+                <a16:creationId xmlns:a16="http://schemas.microsoft.com/office/drawing/2014/main" id="{72A6C2BB-5C63-2735-1699-8CCFA218F7A3}"/>
+              </a:ext>
+            </a:extLst>
+          </p:cNvPr>
+          <p:cNvPicPr>
+            <a:picLocks noChangeAspect="1"/>
+          </p:cNvPicPr>
+          <p:nvPr/>
+        </p:nvPicPr>
+        <p:blipFill>
+          <a:blip r:embed="rId2">
+            <a:extLst>
+              <a:ext uri="{28A0092B-C50C-407E-A947-70E740481C1C}">
+                <a14:useLocalDpi xmlns:a14="http://schemas.microsoft.com/office/drawing/2010/main" val="0"/>
+              </a:ext>
+              <a:ext uri="{96DAC541-7B7A-43D3-8B79-37D633B846F1}">
+                <asvg:svgBlip xmlns:asvg="http://schemas.microsoft.com/office/drawing/2016/SVG/main" r:embed="rId3"/>
+              </a:ext>
+            </a:extLst>
+          </a:blip>
+          <a:stretch>
+            <a:fillRect/>
+          </a:stretch>
+        </p:blipFill>
+        <p:spPr>
+          <a:xfrm>
+            <a:off x="6244251" y="805583"/>
+            <a:ext cx="4660762" cy="4660762"/>
+          </a:xfrm>
+          <a:prstGeom prst="rect">
+            <a:avLst/>
+          </a:prstGeom>
+        </p:spPr>
+      </p:pic>
+    </p:spTree>
+    <p:extLst>
+      <p:ext uri="{BB962C8B-B14F-4D97-AF65-F5344CB8AC3E}">
+        <p14:creationId xmlns:p14="http://schemas.microsoft.com/office/powerpoint/2010/main" val="817649381"/>
+      </p:ext>
+    </p:extLst>
+  </p:cSld>
+  <p:clrMapOvr>
+    <a:masterClrMapping/>
+  </p:clrMapOvr>
+</p:sld>
+</file>
+
+<file path=ppt/slides/slide16.xml><?xml version="1.0" encoding="utf-8"?>
 <p:sld xmlns:a="http://schemas.openxmlformats.org/drawingml/2006/main" xmlns:r="http://schemas.openxmlformats.org/officeDocument/2006/relationships" xmlns:p="http://schemas.openxmlformats.org/presentationml/2006/main">
   <p:cSld>
     <p:bg>
@@ -22288,7 +23018,7 @@
 </p:sld>
 </file>
 
-<file path=ppt/slides/slide15.xml><?xml version="1.0" encoding="utf-8"?>
+<file path=ppt/slides/slide17.xml><?xml version="1.0" encoding="utf-8"?>
 <p:sld xmlns:a="http://schemas.openxmlformats.org/drawingml/2006/main" xmlns:r="http://schemas.openxmlformats.org/officeDocument/2006/relationships" xmlns:p="http://schemas.openxmlformats.org/presentationml/2006/main">
   <p:cSld>
     <p:bg>
@@ -23394,7 +24124,627 @@
 </p:sld>
 </file>
 
-<file path=ppt/slides/slide16.xml><?xml version="1.0" encoding="utf-8"?>
+<file path=ppt/slides/slide18.xml><?xml version="1.0" encoding="utf-8"?>
+<p:sld xmlns:a="http://schemas.openxmlformats.org/drawingml/2006/main" xmlns:r="http://schemas.openxmlformats.org/officeDocument/2006/relationships" xmlns:p="http://schemas.openxmlformats.org/presentationml/2006/main">
+  <p:cSld>
+    <p:bg>
+      <p:bgPr>
+        <a:gradFill rotWithShape="1">
+          <a:gsLst>
+            <a:gs pos="0">
+              <a:schemeClr val="bg2">
+                <a:tint val="94000"/>
+                <a:satMod val="80000"/>
+                <a:lumMod val="106000"/>
+              </a:schemeClr>
+            </a:gs>
+            <a:gs pos="100000">
+              <a:schemeClr val="bg2">
+                <a:shade val="80000"/>
+              </a:schemeClr>
+            </a:gs>
+          </a:gsLst>
+          <a:path path="circle">
+            <a:fillToRect l="43000" r="43000" b="100000"/>
+          </a:path>
+        </a:gradFill>
+        <a:effectLst/>
+      </p:bgPr>
+    </p:bg>
+    <p:spTree>
+      <p:nvGrpSpPr>
+        <p:cNvPr id="1" name=""/>
+        <p:cNvGrpSpPr/>
+        <p:nvPr/>
+      </p:nvGrpSpPr>
+      <p:grpSpPr>
+        <a:xfrm>
+          <a:off x="0" y="0"/>
+          <a:ext cx="0" cy="0"/>
+          <a:chOff x="0" y="0"/>
+          <a:chExt cx="0" cy="0"/>
+        </a:xfrm>
+      </p:grpSpPr>
+      <p:sp>
+        <p:nvSpPr>
+          <p:cNvPr id="10" name="Rectangle 9">
+            <a:extLst>
+              <a:ext uri="{FF2B5EF4-FFF2-40B4-BE49-F238E27FC236}">
+                <a16:creationId xmlns:a16="http://schemas.microsoft.com/office/drawing/2014/main" id="{0CABCAE3-64FC-4149-819F-2C1812824154}"/>
+              </a:ext>
+              <a:ext uri="{C183D7F6-B498-43B3-948B-1728B52AA6E4}">
+                <adec:decorative xmlns:adec="http://schemas.microsoft.com/office/drawing/2017/decorative" val="1"/>
+              </a:ext>
+            </a:extLst>
+          </p:cNvPr>
+          <p:cNvSpPr>
+            <a:spLocks noGrp="1" noRot="1" noChangeAspect="1" noMove="1" noResize="1" noEditPoints="1" noAdjustHandles="1" noChangeArrowheads="1" noChangeShapeType="1" noTextEdit="1"/>
+          </p:cNvSpPr>
+          <p:nvPr>
+            <p:extLst>
+              <p:ext uri="{386F3935-93C4-4BCD-93E2-E3B085C9AB24}">
+                <p16:designElem xmlns:p16="http://schemas.microsoft.com/office/powerpoint/2015/main" val="1"/>
+              </p:ext>
+            </p:extLst>
+          </p:nvPr>
+        </p:nvSpPr>
+        <p:spPr>
+          <a:xfrm>
+            <a:off x="0" y="2019476"/>
+            <a:ext cx="12192000" cy="4105941"/>
+          </a:xfrm>
+          <a:prstGeom prst="rect">
+            <a:avLst/>
+          </a:prstGeom>
+          <a:gradFill flip="none" rotWithShape="1">
+            <a:gsLst>
+              <a:gs pos="0">
+                <a:schemeClr val="bg2">
+                  <a:alpha val="0"/>
+                </a:schemeClr>
+              </a:gs>
+              <a:gs pos="100000">
+                <a:schemeClr val="bg2"/>
+              </a:gs>
+            </a:gsLst>
+            <a:lin ang="5400000" scaled="0"/>
+            <a:tileRect/>
+          </a:gradFill>
+          <a:ln>
+            <a:noFill/>
+          </a:ln>
+        </p:spPr>
+        <p:style>
+          <a:lnRef idx="2">
+            <a:schemeClr val="accent1">
+              <a:shade val="50000"/>
+            </a:schemeClr>
+          </a:lnRef>
+          <a:fillRef idx="1">
+            <a:schemeClr val="accent1"/>
+          </a:fillRef>
+          <a:effectRef idx="0">
+            <a:schemeClr val="accent1"/>
+          </a:effectRef>
+          <a:fontRef idx="minor">
+            <a:schemeClr val="lt1"/>
+          </a:fontRef>
+        </p:style>
+      </p:sp>
+      <p:pic>
+        <p:nvPicPr>
+          <p:cNvPr id="12" name="Picture 11">
+            <a:extLst>
+              <a:ext uri="{FF2B5EF4-FFF2-40B4-BE49-F238E27FC236}">
+                <a16:creationId xmlns:a16="http://schemas.microsoft.com/office/drawing/2014/main" id="{012FDCFE-9AD2-4D8A-8CBF-B3AA37EBF6DD}"/>
+              </a:ext>
+              <a:ext uri="{C183D7F6-B498-43B3-948B-1728B52AA6E4}">
+                <adec:decorative xmlns:adec="http://schemas.microsoft.com/office/drawing/2017/decorative" val="1"/>
+              </a:ext>
+            </a:extLst>
+          </p:cNvPr>
+          <p:cNvPicPr>
+            <a:picLocks noGrp="1" noRot="1" noChangeAspect="1" noMove="1" noResize="1" noEditPoints="1" noAdjustHandles="1" noChangeArrowheads="1" noChangeShapeType="1" noCrop="1"/>
+          </p:cNvPicPr>
+          <p:nvPr>
+            <p:extLst>
+              <p:ext uri="{386F3935-93C4-4BCD-93E2-E3B085C9AB24}">
+                <p16:designElem xmlns:p16="http://schemas.microsoft.com/office/powerpoint/2015/main" val="1"/>
+              </p:ext>
+            </p:extLst>
+          </p:nvPr>
+        </p:nvPicPr>
+        <p:blipFill rotWithShape="1">
+          <a:blip r:embed="rId2">
+            <a:extLst>
+              <a:ext uri="{28A0092B-C50C-407E-A947-70E740481C1C}">
+                <a14:useLocalDpi xmlns:a14="http://schemas.microsoft.com/office/drawing/2010/main" val="0"/>
+              </a:ext>
+            </a:extLst>
+          </a:blip>
+          <a:srcRect t="1538" b="-1538"/>
+          <a:stretch/>
+        </p:blipFill>
+        <p:spPr bwMode="black">
+          <a:xfrm>
+            <a:off x="0" y="6126480"/>
+            <a:ext cx="12192000" cy="742950"/>
+          </a:xfrm>
+          <a:prstGeom prst="rect">
+            <a:avLst/>
+          </a:prstGeom>
+        </p:spPr>
+      </p:pic>
+      <p:cxnSp>
+        <p:nvCxnSpPr>
+          <p:cNvPr id="14" name="Straight Connector 13">
+            <a:extLst>
+              <a:ext uri="{FF2B5EF4-FFF2-40B4-BE49-F238E27FC236}">
+                <a16:creationId xmlns:a16="http://schemas.microsoft.com/office/drawing/2014/main" id="{FBD463FC-4CA8-4FF4-85A3-AF9F4B98D210}"/>
+              </a:ext>
+              <a:ext uri="{C183D7F6-B498-43B3-948B-1728B52AA6E4}">
+                <adec:decorative xmlns:adec="http://schemas.microsoft.com/office/drawing/2017/decorative" val="1"/>
+              </a:ext>
+            </a:extLst>
+          </p:cNvPr>
+          <p:cNvCxnSpPr>
+            <a:cxnSpLocks noGrp="1" noRot="1" noChangeAspect="1" noMove="1" noResize="1" noEditPoints="1" noAdjustHandles="1" noChangeArrowheads="1" noChangeShapeType="1"/>
+          </p:cNvCxnSpPr>
+          <p:nvPr>
+            <p:extLst>
+              <p:ext uri="{386F3935-93C4-4BCD-93E2-E3B085C9AB24}">
+                <p16:designElem xmlns:p16="http://schemas.microsoft.com/office/powerpoint/2015/main" val="1"/>
+              </p:ext>
+            </p:extLst>
+          </p:nvPr>
+        </p:nvCxnSpPr>
+        <p:spPr>
+          <a:xfrm>
+            <a:off x="0" y="6128413"/>
+            <a:ext cx="12192000" cy="0"/>
+          </a:xfrm>
+          <a:prstGeom prst="line">
+            <a:avLst/>
+          </a:prstGeom>
+          <a:ln w="12700">
+            <a:solidFill>
+              <a:srgbClr val="000001">
+                <a:alpha val="20000"/>
+              </a:srgbClr>
+            </a:solidFill>
+          </a:ln>
+        </p:spPr>
+        <p:style>
+          <a:lnRef idx="1">
+            <a:schemeClr val="accent1"/>
+          </a:lnRef>
+          <a:fillRef idx="0">
+            <a:schemeClr val="accent1"/>
+          </a:fillRef>
+          <a:effectRef idx="0">
+            <a:schemeClr val="accent1"/>
+          </a:effectRef>
+          <a:fontRef idx="minor">
+            <a:schemeClr val="tx1"/>
+          </a:fontRef>
+        </p:style>
+      </p:cxnSp>
+      <p:cxnSp>
+        <p:nvCxnSpPr>
+          <p:cNvPr id="16" name="Straight Connector 15">
+            <a:extLst>
+              <a:ext uri="{FF2B5EF4-FFF2-40B4-BE49-F238E27FC236}">
+                <a16:creationId xmlns:a16="http://schemas.microsoft.com/office/drawing/2014/main" id="{BECF35C3-8B44-4F4B-BD25-4C01823DB22A}"/>
+              </a:ext>
+              <a:ext uri="{C183D7F6-B498-43B3-948B-1728B52AA6E4}">
+                <adec:decorative xmlns:adec="http://schemas.microsoft.com/office/drawing/2017/decorative" val="1"/>
+              </a:ext>
+            </a:extLst>
+          </p:cNvPr>
+          <p:cNvCxnSpPr>
+            <a:cxnSpLocks noGrp="1" noRot="1" noChangeAspect="1" noMove="1" noResize="1" noEditPoints="1" noAdjustHandles="1" noChangeArrowheads="1" noChangeShapeType="1"/>
+          </p:cNvCxnSpPr>
+          <p:nvPr>
+            <p:extLst>
+              <p:ext uri="{386F3935-93C4-4BCD-93E2-E3B085C9AB24}">
+                <p16:designElem xmlns:p16="http://schemas.microsoft.com/office/powerpoint/2015/main" val="1"/>
+              </p:ext>
+            </p:extLst>
+          </p:nvPr>
+        </p:nvCxnSpPr>
+        <p:spPr>
+          <a:xfrm>
+            <a:off x="2417780" y="3528542"/>
+            <a:ext cx="8637072" cy="0"/>
+          </a:xfrm>
+          <a:prstGeom prst="line">
+            <a:avLst/>
+          </a:prstGeom>
+          <a:ln w="31750"/>
+        </p:spPr>
+        <p:style>
+          <a:lnRef idx="3">
+            <a:schemeClr val="accent1"/>
+          </a:lnRef>
+          <a:fillRef idx="0">
+            <a:schemeClr val="accent1"/>
+          </a:fillRef>
+          <a:effectRef idx="2">
+            <a:schemeClr val="accent1"/>
+          </a:effectRef>
+          <a:fontRef idx="minor">
+            <a:schemeClr val="tx1"/>
+          </a:fontRef>
+        </p:style>
+      </p:cxnSp>
+      <p:sp useBgFill="1">
+        <p:nvSpPr>
+          <p:cNvPr id="18" name="Rectangle 17">
+            <a:extLst>
+              <a:ext uri="{FF2B5EF4-FFF2-40B4-BE49-F238E27FC236}">
+                <a16:creationId xmlns:a16="http://schemas.microsoft.com/office/drawing/2014/main" id="{D0712110-0BC1-4B31-B3BB-63B44222E87F}"/>
+              </a:ext>
+              <a:ext uri="{C183D7F6-B498-43B3-948B-1728B52AA6E4}">
+                <adec:decorative xmlns:adec="http://schemas.microsoft.com/office/drawing/2017/decorative" val="1"/>
+              </a:ext>
+            </a:extLst>
+          </p:cNvPr>
+          <p:cNvSpPr>
+            <a:spLocks noGrp="1" noRot="1" noChangeAspect="1" noMove="1" noResize="1" noEditPoints="1" noAdjustHandles="1" noChangeArrowheads="1" noChangeShapeType="1" noTextEdit="1"/>
+          </p:cNvSpPr>
+          <p:nvPr>
+            <p:extLst>
+              <p:ext uri="{386F3935-93C4-4BCD-93E2-E3B085C9AB24}">
+                <p16:designElem xmlns:p16="http://schemas.microsoft.com/office/powerpoint/2015/main" val="1"/>
+              </p:ext>
+            </p:extLst>
+          </p:nvPr>
+        </p:nvSpPr>
+        <p:spPr>
+          <a:xfrm>
+            <a:off x="2" y="0"/>
+            <a:ext cx="12191695" cy="6858000"/>
+          </a:xfrm>
+          <a:prstGeom prst="rect">
+            <a:avLst/>
+          </a:prstGeom>
+          <a:ln>
+            <a:noFill/>
+          </a:ln>
+        </p:spPr>
+        <p:style>
+          <a:lnRef idx="2">
+            <a:schemeClr val="accent1">
+              <a:shade val="50000"/>
+            </a:schemeClr>
+          </a:lnRef>
+          <a:fillRef idx="1">
+            <a:schemeClr val="accent1"/>
+          </a:fillRef>
+          <a:effectRef idx="0">
+            <a:schemeClr val="accent1"/>
+          </a:effectRef>
+          <a:fontRef idx="minor">
+            <a:schemeClr val="lt1"/>
+          </a:fontRef>
+        </p:style>
+        <p:txBody>
+          <a:bodyPr rtlCol="0" anchor="ctr"/>
+          <a:lstStyle/>
+          <a:p>
+            <a:pPr algn="ctr"/>
+            <a:endParaRPr lang="en-US"/>
+          </a:p>
+        </p:txBody>
+      </p:sp>
+      <p:sp>
+        <p:nvSpPr>
+          <p:cNvPr id="20" name="Rectangle 19">
+            <a:extLst>
+              <a:ext uri="{FF2B5EF4-FFF2-40B4-BE49-F238E27FC236}">
+                <a16:creationId xmlns:a16="http://schemas.microsoft.com/office/drawing/2014/main" id="{4466B5F3-C053-4580-B04A-1EF949888280}"/>
+              </a:ext>
+              <a:ext uri="{C183D7F6-B498-43B3-948B-1728B52AA6E4}">
+                <adec:decorative xmlns:adec="http://schemas.microsoft.com/office/drawing/2017/decorative" val="1"/>
+              </a:ext>
+            </a:extLst>
+          </p:cNvPr>
+          <p:cNvSpPr>
+            <a:spLocks noGrp="1" noRot="1" noChangeAspect="1" noMove="1" noResize="1" noEditPoints="1" noAdjustHandles="1" noChangeArrowheads="1" noChangeShapeType="1" noTextEdit="1"/>
+          </p:cNvSpPr>
+          <p:nvPr>
+            <p:extLst>
+              <p:ext uri="{386F3935-93C4-4BCD-93E2-E3B085C9AB24}">
+                <p16:designElem xmlns:p16="http://schemas.microsoft.com/office/powerpoint/2015/main" val="1"/>
+              </p:ext>
+            </p:extLst>
+          </p:nvPr>
+        </p:nvSpPr>
+        <p:spPr>
+          <a:xfrm>
+            <a:off x="0" y="2019476"/>
+            <a:ext cx="12192000" cy="4105941"/>
+          </a:xfrm>
+          <a:prstGeom prst="rect">
+            <a:avLst/>
+          </a:prstGeom>
+          <a:gradFill flip="none" rotWithShape="1">
+            <a:gsLst>
+              <a:gs pos="0">
+                <a:schemeClr val="bg2">
+                  <a:alpha val="0"/>
+                </a:schemeClr>
+              </a:gs>
+              <a:gs pos="100000">
+                <a:schemeClr val="bg2"/>
+              </a:gs>
+            </a:gsLst>
+            <a:lin ang="5400000" scaled="0"/>
+            <a:tileRect/>
+          </a:gradFill>
+          <a:ln>
+            <a:noFill/>
+          </a:ln>
+        </p:spPr>
+        <p:style>
+          <a:lnRef idx="2">
+            <a:schemeClr val="accent1">
+              <a:shade val="50000"/>
+            </a:schemeClr>
+          </a:lnRef>
+          <a:fillRef idx="1">
+            <a:schemeClr val="accent1"/>
+          </a:fillRef>
+          <a:effectRef idx="0">
+            <a:schemeClr val="accent1"/>
+          </a:effectRef>
+          <a:fontRef idx="minor">
+            <a:schemeClr val="lt1"/>
+          </a:fontRef>
+        </p:style>
+        <p:txBody>
+          <a:bodyPr rtlCol="0" anchor="ctr"/>
+          <a:lstStyle/>
+          <a:p>
+            <a:pPr lvl="0" algn="ctr"/>
+            <a:endParaRPr lang="en-US"/>
+          </a:p>
+        </p:txBody>
+      </p:sp>
+      <p:sp>
+        <p:nvSpPr>
+          <p:cNvPr id="2" name="Title 1">
+            <a:extLst>
+              <a:ext uri="{FF2B5EF4-FFF2-40B4-BE49-F238E27FC236}">
+                <a16:creationId xmlns:a16="http://schemas.microsoft.com/office/drawing/2014/main" id="{568F032C-6922-83EE-86FC-0FD781109751}"/>
+              </a:ext>
+            </a:extLst>
+          </p:cNvPr>
+          <p:cNvSpPr>
+            <a:spLocks noGrp="1"/>
+          </p:cNvSpPr>
+          <p:nvPr>
+            <p:ph type="title"/>
+          </p:nvPr>
+        </p:nvSpPr>
+        <p:spPr>
+          <a:xfrm>
+            <a:off x="1452616" y="962902"/>
+            <a:ext cx="4176384" cy="2380828"/>
+          </a:xfrm>
+        </p:spPr>
+        <p:txBody>
+          <a:bodyPr vert="horz" lIns="91440" tIns="45720" rIns="91440" bIns="0" rtlCol="0" anchor="b">
+            <a:normAutofit/>
+          </a:bodyPr>
+          <a:lstStyle/>
+          <a:p>
+            <a:r>
+              <a:rPr lang="en-US" sz="4800"/>
+              <a:t>Otros varios</a:t>
+            </a:r>
+          </a:p>
+        </p:txBody>
+      </p:sp>
+      <p:cxnSp>
+        <p:nvCxnSpPr>
+          <p:cNvPr id="22" name="Straight Connector 21">
+            <a:extLst>
+              <a:ext uri="{FF2B5EF4-FFF2-40B4-BE49-F238E27FC236}">
+                <a16:creationId xmlns:a16="http://schemas.microsoft.com/office/drawing/2014/main" id="{FA6123F2-4B61-414F-A7E5-5B7828EACAE2}"/>
+              </a:ext>
+              <a:ext uri="{C183D7F6-B498-43B3-948B-1728B52AA6E4}">
+                <adec:decorative xmlns:adec="http://schemas.microsoft.com/office/drawing/2017/decorative" val="1"/>
+              </a:ext>
+            </a:extLst>
+          </p:cNvPr>
+          <p:cNvCxnSpPr>
+            <a:cxnSpLocks noGrp="1" noRot="1" noChangeAspect="1" noMove="1" noResize="1" noEditPoints="1" noAdjustHandles="1" noChangeArrowheads="1" noChangeShapeType="1"/>
+          </p:cNvCxnSpPr>
+          <p:nvPr>
+            <p:extLst>
+              <p:ext uri="{386F3935-93C4-4BCD-93E2-E3B085C9AB24}">
+                <p16:designElem xmlns:p16="http://schemas.microsoft.com/office/powerpoint/2015/main" val="1"/>
+              </p:ext>
+            </p:extLst>
+          </p:nvPr>
+        </p:nvCxnSpPr>
+        <p:spPr>
+          <a:xfrm>
+            <a:off x="1452617" y="3528543"/>
+            <a:ext cx="4171479" cy="0"/>
+          </a:xfrm>
+          <a:prstGeom prst="line">
+            <a:avLst/>
+          </a:prstGeom>
+          <a:ln w="31750"/>
+        </p:spPr>
+        <p:style>
+          <a:lnRef idx="3">
+            <a:schemeClr val="accent1"/>
+          </a:lnRef>
+          <a:fillRef idx="0">
+            <a:schemeClr val="accent1"/>
+          </a:fillRef>
+          <a:effectRef idx="2">
+            <a:schemeClr val="accent1"/>
+          </a:effectRef>
+          <a:fontRef idx="minor">
+            <a:schemeClr val="tx1"/>
+          </a:fontRef>
+        </p:style>
+      </p:cxnSp>
+      <p:pic>
+        <p:nvPicPr>
+          <p:cNvPr id="7" name="Graphic 6" descr="Wind Chime">
+            <a:extLst>
+              <a:ext uri="{FF2B5EF4-FFF2-40B4-BE49-F238E27FC236}">
+                <a16:creationId xmlns:a16="http://schemas.microsoft.com/office/drawing/2014/main" id="{4FE1C1A3-0874-3C2A-9492-29B305CB8917}"/>
+              </a:ext>
+            </a:extLst>
+          </p:cNvPr>
+          <p:cNvPicPr>
+            <a:picLocks noChangeAspect="1"/>
+          </p:cNvPicPr>
+          <p:nvPr/>
+        </p:nvPicPr>
+        <p:blipFill>
+          <a:blip r:embed="rId3">
+            <a:extLst>
+              <a:ext uri="{28A0092B-C50C-407E-A947-70E740481C1C}">
+                <a14:useLocalDpi xmlns:a14="http://schemas.microsoft.com/office/drawing/2010/main" val="0"/>
+              </a:ext>
+              <a:ext uri="{96DAC541-7B7A-43D3-8B79-37D633B846F1}">
+                <asvg:svgBlip xmlns:asvg="http://schemas.microsoft.com/office/drawing/2016/SVG/main" r:embed="rId4"/>
+              </a:ext>
+            </a:extLst>
+          </a:blip>
+          <a:stretch>
+            <a:fillRect/>
+          </a:stretch>
+        </p:blipFill>
+        <p:spPr>
+          <a:xfrm>
+            <a:off x="6244251" y="805583"/>
+            <a:ext cx="4660762" cy="4660762"/>
+          </a:xfrm>
+          <a:prstGeom prst="rect">
+            <a:avLst/>
+          </a:prstGeom>
+        </p:spPr>
+      </p:pic>
+      <p:pic>
+        <p:nvPicPr>
+          <p:cNvPr id="24" name="Picture 23">
+            <a:extLst>
+              <a:ext uri="{FF2B5EF4-FFF2-40B4-BE49-F238E27FC236}">
+                <a16:creationId xmlns:a16="http://schemas.microsoft.com/office/drawing/2014/main" id="{25CED634-E2D0-4AB7-96DD-816C9B52C5CF}"/>
+              </a:ext>
+              <a:ext uri="{C183D7F6-B498-43B3-948B-1728B52AA6E4}">
+                <adec:decorative xmlns:adec="http://schemas.microsoft.com/office/drawing/2017/decorative" val="1"/>
+              </a:ext>
+            </a:extLst>
+          </p:cNvPr>
+          <p:cNvPicPr>
+            <a:picLocks noGrp="1" noRot="1" noChangeAspect="1" noMove="1" noResize="1" noEditPoints="1" noAdjustHandles="1" noChangeArrowheads="1" noChangeShapeType="1" noCrop="1"/>
+          </p:cNvPicPr>
+          <p:nvPr>
+            <p:extLst>
+              <p:ext uri="{386F3935-93C4-4BCD-93E2-E3B085C9AB24}">
+                <p16:designElem xmlns:p16="http://schemas.microsoft.com/office/powerpoint/2015/main" val="1"/>
+              </p:ext>
+            </p:extLst>
+          </p:nvPr>
+        </p:nvPicPr>
+        <p:blipFill rotWithShape="1">
+          <a:blip r:embed="rId2">
+            <a:extLst>
+              <a:ext uri="{28A0092B-C50C-407E-A947-70E740481C1C}">
+                <a14:useLocalDpi xmlns:a14="http://schemas.microsoft.com/office/drawing/2010/main" val="0"/>
+              </a:ext>
+            </a:extLst>
+          </a:blip>
+          <a:srcRect t="1538" b="-1538"/>
+          <a:stretch/>
+        </p:blipFill>
+        <p:spPr bwMode="black">
+          <a:xfrm>
+            <a:off x="0" y="6126480"/>
+            <a:ext cx="12192000" cy="742950"/>
+          </a:xfrm>
+          <a:prstGeom prst="rect">
+            <a:avLst/>
+          </a:prstGeom>
+        </p:spPr>
+      </p:pic>
+      <p:cxnSp>
+        <p:nvCxnSpPr>
+          <p:cNvPr id="26" name="Straight Connector 25">
+            <a:extLst>
+              <a:ext uri="{FF2B5EF4-FFF2-40B4-BE49-F238E27FC236}">
+                <a16:creationId xmlns:a16="http://schemas.microsoft.com/office/drawing/2014/main" id="{FCDDCDFB-696D-4FDF-9B58-24F71B7C37BC}"/>
+              </a:ext>
+              <a:ext uri="{C183D7F6-B498-43B3-948B-1728B52AA6E4}">
+                <adec:decorative xmlns:adec="http://schemas.microsoft.com/office/drawing/2017/decorative" val="1"/>
+              </a:ext>
+            </a:extLst>
+          </p:cNvPr>
+          <p:cNvCxnSpPr>
+            <a:cxnSpLocks noGrp="1" noRot="1" noChangeAspect="1" noMove="1" noResize="1" noEditPoints="1" noAdjustHandles="1" noChangeArrowheads="1" noChangeShapeType="1"/>
+          </p:cNvCxnSpPr>
+          <p:nvPr>
+            <p:extLst>
+              <p:ext uri="{386F3935-93C4-4BCD-93E2-E3B085C9AB24}">
+                <p16:designElem xmlns:p16="http://schemas.microsoft.com/office/powerpoint/2015/main" val="1"/>
+              </p:ext>
+            </p:extLst>
+          </p:nvPr>
+        </p:nvCxnSpPr>
+        <p:spPr>
+          <a:xfrm>
+            <a:off x="0" y="6128413"/>
+            <a:ext cx="12192000" cy="0"/>
+          </a:xfrm>
+          <a:prstGeom prst="line">
+            <a:avLst/>
+          </a:prstGeom>
+          <a:ln w="12700">
+            <a:solidFill>
+              <a:srgbClr val="000001">
+                <a:alpha val="20000"/>
+              </a:srgbClr>
+            </a:solidFill>
+          </a:ln>
+        </p:spPr>
+        <p:style>
+          <a:lnRef idx="1">
+            <a:schemeClr val="accent1"/>
+          </a:lnRef>
+          <a:fillRef idx="0">
+            <a:schemeClr val="accent1"/>
+          </a:fillRef>
+          <a:effectRef idx="0">
+            <a:schemeClr val="accent1"/>
+          </a:effectRef>
+          <a:fontRef idx="minor">
+            <a:schemeClr val="tx1"/>
+          </a:fontRef>
+        </p:style>
+      </p:cxnSp>
+    </p:spTree>
+    <p:extLst>
+      <p:ext uri="{BB962C8B-B14F-4D97-AF65-F5344CB8AC3E}">
+        <p14:creationId xmlns:p14="http://schemas.microsoft.com/office/powerpoint/2010/main" val="4016842014"/>
+      </p:ext>
+    </p:extLst>
+  </p:cSld>
+  <p:clrMapOvr>
+    <a:masterClrMapping/>
+  </p:clrMapOvr>
+</p:sld>
+</file>
+
+<file path=ppt/slides/slide19.xml><?xml version="1.0" encoding="utf-8"?>
 <p:sld xmlns:a="http://schemas.openxmlformats.org/drawingml/2006/main" xmlns:r="http://schemas.openxmlformats.org/officeDocument/2006/relationships" xmlns:p="http://schemas.openxmlformats.org/presentationml/2006/main">
   <p:cSld>
     <p:spTree>
@@ -23500,7 +24850,96 @@
 </p:sld>
 </file>
 
-<file path=ppt/slides/slide17.xml><?xml version="1.0" encoding="utf-8"?>
+<file path=ppt/slides/slide2.xml><?xml version="1.0" encoding="utf-8"?>
+<p:sld xmlns:a="http://schemas.openxmlformats.org/drawingml/2006/main" xmlns:r="http://schemas.openxmlformats.org/officeDocument/2006/relationships" xmlns:p="http://schemas.openxmlformats.org/presentationml/2006/main">
+  <p:cSld>
+    <p:spTree>
+      <p:nvGrpSpPr>
+        <p:cNvPr id="1" name=""/>
+        <p:cNvGrpSpPr/>
+        <p:nvPr/>
+      </p:nvGrpSpPr>
+      <p:grpSpPr>
+        <a:xfrm>
+          <a:off x="0" y="0"/>
+          <a:ext cx="0" cy="0"/>
+          <a:chOff x="0" y="0"/>
+          <a:chExt cx="0" cy="0"/>
+        </a:xfrm>
+      </p:grpSpPr>
+      <p:sp>
+        <p:nvSpPr>
+          <p:cNvPr id="2" name="Título 1">
+            <a:extLst>
+              <a:ext uri="{FF2B5EF4-FFF2-40B4-BE49-F238E27FC236}">
+                <a16:creationId xmlns:a16="http://schemas.microsoft.com/office/drawing/2014/main" id="{52B5F18C-AB50-1C4B-A5C3-069D154AD3E5}"/>
+              </a:ext>
+            </a:extLst>
+          </p:cNvPr>
+          <p:cNvSpPr>
+            <a:spLocks noGrp="1"/>
+          </p:cNvSpPr>
+          <p:nvPr>
+            <p:ph type="title"/>
+          </p:nvPr>
+        </p:nvSpPr>
+        <p:spPr/>
+        <p:txBody>
+          <a:bodyPr/>
+          <a:lstStyle/>
+          <a:p>
+            <a:r>
+              <a:rPr lang="es-MX" dirty="0"/>
+              <a:t>Aníbal del Real</a:t>
+            </a:r>
+          </a:p>
+        </p:txBody>
+      </p:sp>
+      <p:graphicFrame>
+        <p:nvGraphicFramePr>
+          <p:cNvPr id="5" name="Marcador de contenido 2">
+            <a:extLst>
+              <a:ext uri="{FF2B5EF4-FFF2-40B4-BE49-F238E27FC236}">
+                <a16:creationId xmlns:a16="http://schemas.microsoft.com/office/drawing/2014/main" id="{479CAD50-0180-44C3-0B36-99A2632BEB23}"/>
+              </a:ext>
+            </a:extLst>
+          </p:cNvPr>
+          <p:cNvGraphicFramePr>
+            <a:graphicFrameLocks noGrp="1"/>
+          </p:cNvGraphicFramePr>
+          <p:nvPr>
+            <p:ph idx="1"/>
+            <p:extLst>
+              <p:ext uri="{D42A27DB-BD31-4B8C-83A1-F6EECF244321}">
+                <p14:modId xmlns:p14="http://schemas.microsoft.com/office/powerpoint/2010/main" val="3254812924"/>
+              </p:ext>
+            </p:extLst>
+          </p:nvPr>
+        </p:nvGraphicFramePr>
+        <p:xfrm>
+          <a:off x="4064000" y="1825625"/>
+          <a:ext cx="7289800" cy="4351338"/>
+        </p:xfrm>
+        <a:graphic>
+          <a:graphicData uri="http://schemas.openxmlformats.org/drawingml/2006/diagram">
+            <dgm:relIds xmlns:dgm="http://schemas.openxmlformats.org/drawingml/2006/diagram" xmlns:r="http://schemas.openxmlformats.org/officeDocument/2006/relationships" r:dm="rId2" r:lo="rId3" r:qs="rId4" r:cs="rId5"/>
+          </a:graphicData>
+        </a:graphic>
+      </p:graphicFrame>
+    </p:spTree>
+    <p:extLst>
+      <p:ext uri="{BB962C8B-B14F-4D97-AF65-F5344CB8AC3E}">
+        <p14:creationId xmlns:p14="http://schemas.microsoft.com/office/powerpoint/2010/main" val="4094584148"/>
+      </p:ext>
+    </p:extLst>
+  </p:cSld>
+  <p:clrMapOvr>
+    <a:masterClrMapping/>
+  </p:clrMapOvr>
+</p:sld>
+</file>
+
+<file path=ppt/slides/slide20.xml><?xml version="1.0" encoding="utf-8"?>
 <p:sld xmlns:a="http://schemas.openxmlformats.org/drawingml/2006/main" xmlns:r="http://schemas.openxmlformats.org/officeDocument/2006/relationships" xmlns:p="http://schemas.openxmlformats.org/presentationml/2006/main">
   <p:cSld>
     <p:bg>
@@ -24068,7 +25507,7 @@
 </p:sld>
 </file>
 
-<file path=ppt/slides/slide18.xml><?xml version="1.0" encoding="utf-8"?>
+<file path=ppt/slides/slide21.xml><?xml version="1.0" encoding="utf-8"?>
 <p:sld xmlns:a="http://schemas.openxmlformats.org/drawingml/2006/main" xmlns:r="http://schemas.openxmlformats.org/officeDocument/2006/relationships" xmlns:p="http://schemas.openxmlformats.org/presentationml/2006/main">
   <p:cSld>
     <p:spTree>
@@ -24356,7 +25795,7 @@
 </p:sld>
 </file>
 
-<file path=ppt/slides/slide19.xml><?xml version="1.0" encoding="utf-8"?>
+<file path=ppt/slides/slide22.xml><?xml version="1.0" encoding="utf-8"?>
 <p:sld xmlns:a="http://schemas.openxmlformats.org/drawingml/2006/main" xmlns:r="http://schemas.openxmlformats.org/officeDocument/2006/relationships" xmlns:p="http://schemas.openxmlformats.org/presentationml/2006/main">
   <p:cSld>
     <p:spTree>
@@ -24442,96 +25881,7 @@
 </p:sld>
 </file>
 
-<file path=ppt/slides/slide2.xml><?xml version="1.0" encoding="utf-8"?>
-<p:sld xmlns:a="http://schemas.openxmlformats.org/drawingml/2006/main" xmlns:r="http://schemas.openxmlformats.org/officeDocument/2006/relationships" xmlns:p="http://schemas.openxmlformats.org/presentationml/2006/main">
-  <p:cSld>
-    <p:spTree>
-      <p:nvGrpSpPr>
-        <p:cNvPr id="1" name=""/>
-        <p:cNvGrpSpPr/>
-        <p:nvPr/>
-      </p:nvGrpSpPr>
-      <p:grpSpPr>
-        <a:xfrm>
-          <a:off x="0" y="0"/>
-          <a:ext cx="0" cy="0"/>
-          <a:chOff x="0" y="0"/>
-          <a:chExt cx="0" cy="0"/>
-        </a:xfrm>
-      </p:grpSpPr>
-      <p:sp>
-        <p:nvSpPr>
-          <p:cNvPr id="2" name="Título 1">
-            <a:extLst>
-              <a:ext uri="{FF2B5EF4-FFF2-40B4-BE49-F238E27FC236}">
-                <a16:creationId xmlns:a16="http://schemas.microsoft.com/office/drawing/2014/main" id="{52B5F18C-AB50-1C4B-A5C3-069D154AD3E5}"/>
-              </a:ext>
-            </a:extLst>
-          </p:cNvPr>
-          <p:cNvSpPr>
-            <a:spLocks noGrp="1"/>
-          </p:cNvSpPr>
-          <p:nvPr>
-            <p:ph type="title"/>
-          </p:nvPr>
-        </p:nvSpPr>
-        <p:spPr/>
-        <p:txBody>
-          <a:bodyPr/>
-          <a:lstStyle/>
-          <a:p>
-            <a:r>
-              <a:rPr lang="es-MX" dirty="0"/>
-              <a:t>Aníbal del Real</a:t>
-            </a:r>
-          </a:p>
-        </p:txBody>
-      </p:sp>
-      <p:graphicFrame>
-        <p:nvGraphicFramePr>
-          <p:cNvPr id="5" name="Marcador de contenido 2">
-            <a:extLst>
-              <a:ext uri="{FF2B5EF4-FFF2-40B4-BE49-F238E27FC236}">
-                <a16:creationId xmlns:a16="http://schemas.microsoft.com/office/drawing/2014/main" id="{479CAD50-0180-44C3-0B36-99A2632BEB23}"/>
-              </a:ext>
-            </a:extLst>
-          </p:cNvPr>
-          <p:cNvGraphicFramePr>
-            <a:graphicFrameLocks noGrp="1"/>
-          </p:cNvGraphicFramePr>
-          <p:nvPr>
-            <p:ph idx="1"/>
-            <p:extLst>
-              <p:ext uri="{D42A27DB-BD31-4B8C-83A1-F6EECF244321}">
-                <p14:modId xmlns:p14="http://schemas.microsoft.com/office/powerpoint/2010/main" val="3254812924"/>
-              </p:ext>
-            </p:extLst>
-          </p:nvPr>
-        </p:nvGraphicFramePr>
-        <p:xfrm>
-          <a:off x="4064000" y="1825625"/>
-          <a:ext cx="7289800" cy="4351338"/>
-        </p:xfrm>
-        <a:graphic>
-          <a:graphicData uri="http://schemas.openxmlformats.org/drawingml/2006/diagram">
-            <dgm:relIds xmlns:dgm="http://schemas.openxmlformats.org/drawingml/2006/diagram" xmlns:r="http://schemas.openxmlformats.org/officeDocument/2006/relationships" r:dm="rId2" r:lo="rId3" r:qs="rId4" r:cs="rId5"/>
-          </a:graphicData>
-        </a:graphic>
-      </p:graphicFrame>
-    </p:spTree>
-    <p:extLst>
-      <p:ext uri="{BB962C8B-B14F-4D97-AF65-F5344CB8AC3E}">
-        <p14:creationId xmlns:p14="http://schemas.microsoft.com/office/powerpoint/2010/main" val="4094584148"/>
-      </p:ext>
-    </p:extLst>
-  </p:cSld>
-  <p:clrMapOvr>
-    <a:masterClrMapping/>
-  </p:clrMapOvr>
-</p:sld>
-</file>
-
-<file path=ppt/slides/slide20.xml><?xml version="1.0" encoding="utf-8"?>
+<file path=ppt/slides/slide23.xml><?xml version="1.0" encoding="utf-8"?>
 <p:sld xmlns:a="http://schemas.openxmlformats.org/drawingml/2006/main" xmlns:r="http://schemas.openxmlformats.org/officeDocument/2006/relationships" xmlns:p="http://schemas.openxmlformats.org/presentationml/2006/main">
   <p:cSld>
     <p:bg>
@@ -25169,7 +26519,7 @@
 </p:sld>
 </file>
 
-<file path=ppt/slides/slide21.xml><?xml version="1.0" encoding="utf-8"?>
+<file path=ppt/slides/slide24.xml><?xml version="1.0" encoding="utf-8"?>
 <p:sld xmlns:a="http://schemas.openxmlformats.org/drawingml/2006/main" xmlns:r="http://schemas.openxmlformats.org/officeDocument/2006/relationships" xmlns:p="http://schemas.openxmlformats.org/presentationml/2006/main">
   <p:cSld>
     <p:bg>
@@ -25925,7 +27275,7 @@
 </p:sld>
 </file>
 
-<file path=ppt/slides/slide22.xml><?xml version="1.0" encoding="utf-8"?>
+<file path=ppt/slides/slide25.xml><?xml version="1.0" encoding="utf-8"?>
 <p:sld xmlns:a="http://schemas.openxmlformats.org/drawingml/2006/main" xmlns:r="http://schemas.openxmlformats.org/officeDocument/2006/relationships" xmlns:p="http://schemas.openxmlformats.org/presentationml/2006/main">
   <p:cSld>
     <p:bg>
@@ -26386,7 +27736,7 @@
 </p:sld>
 </file>
 
-<file path=ppt/slides/slide23.xml><?xml version="1.0" encoding="utf-8"?>
+<file path=ppt/slides/slide26.xml><?xml version="1.0" encoding="utf-8"?>
 <p:sld xmlns:a="http://schemas.openxmlformats.org/drawingml/2006/main" xmlns:r="http://schemas.openxmlformats.org/officeDocument/2006/relationships" xmlns:p="http://schemas.openxmlformats.org/presentationml/2006/main">
   <p:cSld>
     <p:bg>
@@ -27140,86 +28490,6 @@
   </p:cSld>
   <p:clrMapOvr>
     <a:overrideClrMapping bg1="dk1" tx1="lt1" bg2="dk2" tx2="lt2" accent1="accent1" accent2="accent2" accent3="accent3" accent4="accent4" accent5="accent5" accent6="accent6" hlink="hlink" folHlink="folHlink"/>
-  </p:clrMapOvr>
-</p:sld>
-</file>
-
-<file path=ppt/slides/slide24.xml><?xml version="1.0" encoding="utf-8"?>
-<p:sld xmlns:a="http://schemas.openxmlformats.org/drawingml/2006/main" xmlns:r="http://schemas.openxmlformats.org/officeDocument/2006/relationships" xmlns:p="http://schemas.openxmlformats.org/presentationml/2006/main">
-  <p:cSld>
-    <p:spTree>
-      <p:nvGrpSpPr>
-        <p:cNvPr id="1" name=""/>
-        <p:cNvGrpSpPr/>
-        <p:nvPr/>
-      </p:nvGrpSpPr>
-      <p:grpSpPr>
-        <a:xfrm>
-          <a:off x="0" y="0"/>
-          <a:ext cx="0" cy="0"/>
-          <a:chOff x="0" y="0"/>
-          <a:chExt cx="0" cy="0"/>
-        </a:xfrm>
-      </p:grpSpPr>
-      <p:sp>
-        <p:nvSpPr>
-          <p:cNvPr id="2" name="Título 1">
-            <a:extLst>
-              <a:ext uri="{FF2B5EF4-FFF2-40B4-BE49-F238E27FC236}">
-                <a16:creationId xmlns:a16="http://schemas.microsoft.com/office/drawing/2014/main" id="{E7630DDB-000E-364D-BBD1-EA6D93226AE4}"/>
-              </a:ext>
-            </a:extLst>
-          </p:cNvPr>
-          <p:cNvSpPr>
-            <a:spLocks noGrp="1"/>
-          </p:cNvSpPr>
-          <p:nvPr>
-            <p:ph type="title"/>
-          </p:nvPr>
-        </p:nvSpPr>
-        <p:spPr/>
-        <p:txBody>
-          <a:bodyPr/>
-          <a:lstStyle/>
-          <a:p>
-            <a:endParaRPr lang="es-MX"/>
-          </a:p>
-        </p:txBody>
-      </p:sp>
-      <p:sp>
-        <p:nvSpPr>
-          <p:cNvPr id="3" name="Marcador de contenido 2">
-            <a:extLst>
-              <a:ext uri="{FF2B5EF4-FFF2-40B4-BE49-F238E27FC236}">
-                <a16:creationId xmlns:a16="http://schemas.microsoft.com/office/drawing/2014/main" id="{83806671-2D6F-0247-86D5-A967895B9B0F}"/>
-              </a:ext>
-            </a:extLst>
-          </p:cNvPr>
-          <p:cNvSpPr>
-            <a:spLocks noGrp="1"/>
-          </p:cNvSpPr>
-          <p:nvPr>
-            <p:ph idx="1"/>
-          </p:nvPr>
-        </p:nvSpPr>
-        <p:spPr/>
-        <p:txBody>
-          <a:bodyPr/>
-          <a:lstStyle/>
-          <a:p>
-            <a:endParaRPr lang="es-MX"/>
-          </a:p>
-        </p:txBody>
-      </p:sp>
-    </p:spTree>
-    <p:extLst>
-      <p:ext uri="{BB962C8B-B14F-4D97-AF65-F5344CB8AC3E}">
-        <p14:creationId xmlns:p14="http://schemas.microsoft.com/office/powerpoint/2010/main" val="2041539883"/>
-      </p:ext>
-    </p:extLst>
-  </p:cSld>
-  <p:clrMapOvr>
-    <a:masterClrMapping/>
   </p:clrMapOvr>
 </p:sld>
 </file>
@@ -28816,7 +30086,7 @@
           <a:lstStyle/>
           <a:p>
             <a:r>
-              <a:rPr lang="es-MX" sz="3000"/>
+              <a:rPr lang="es-MX" sz="3000" dirty="0"/>
               <a:t>Departamento de QA</a:t>
             </a:r>
           </a:p>
@@ -28912,7 +30182,7 @@
           <a:p>
             <a:r>
               <a:rPr lang="es-MX" dirty="0"/>
-              <a:t>El equipo de QA se encarga de asegurar que los productos que obtienen los clientes tengan o superen las expectativas consistentement</a:t>
+              <a:t>El equipo de QA se encarga de asegurar que los productos que obtienen los clientes tengan o superen las expectativas consistentemente</a:t>
             </a:r>
           </a:p>
         </p:txBody>

</xml_diff>

<commit_message>
Add new slides's version
</commit_message>
<xml_diff>
--- a/QA Automation.pptx
+++ b/QA Automation.pptx
@@ -29,8 +29,12 @@
     <p:sldId id="270" r:id="rId23"/>
     <p:sldId id="272" r:id="rId24"/>
     <p:sldId id="273" r:id="rId25"/>
-    <p:sldId id="274" r:id="rId26"/>
-    <p:sldId id="283" r:id="rId27"/>
+    <p:sldId id="284" r:id="rId26"/>
+    <p:sldId id="285" r:id="rId27"/>
+    <p:sldId id="286" r:id="rId28"/>
+    <p:sldId id="287" r:id="rId29"/>
+    <p:sldId id="274" r:id="rId30"/>
+    <p:sldId id="283" r:id="rId31"/>
   </p:sldIdLst>
   <p:sldSz cx="12192000" cy="6858000"/>
   <p:notesSz cx="6858000" cy="9144000"/>
@@ -15693,7 +15697,7 @@
           <a:p>
             <a:fld id="{556EC5F8-7B0E-C242-8464-A64B266D24E4}" type="datetimeFigureOut">
               <a:rPr lang="es-MX" smtClean="0"/>
-              <a:t>12/07/23</a:t>
+              <a:t>13/07/23</a:t>
             </a:fld>
             <a:endParaRPr lang="es-MX"/>
           </a:p>
@@ -15745,7 +15749,7 @@
           <a:p>
             <a:fld id="{EEA749B0-890E-8045-9AED-0FC8AF9C7DE4}" type="slidenum">
               <a:rPr lang="es-MX" smtClean="0"/>
-              <a:t>‹Nº›</a:t>
+              <a:t>‹#›</a:t>
             </a:fld>
             <a:endParaRPr lang="es-MX"/>
           </a:p>
@@ -15904,7 +15908,7 @@
           <a:p>
             <a:fld id="{556EC5F8-7B0E-C242-8464-A64B266D24E4}" type="datetimeFigureOut">
               <a:rPr lang="es-MX" smtClean="0"/>
-              <a:t>12/07/23</a:t>
+              <a:t>13/07/23</a:t>
             </a:fld>
             <a:endParaRPr lang="es-MX"/>
           </a:p>
@@ -15946,7 +15950,7 @@
           <a:p>
             <a:fld id="{EEA749B0-890E-8045-9AED-0FC8AF9C7DE4}" type="slidenum">
               <a:rPr lang="es-MX" smtClean="0"/>
-              <a:t>‹Nº›</a:t>
+              <a:t>‹#›</a:t>
             </a:fld>
             <a:endParaRPr lang="es-MX"/>
           </a:p>
@@ -16119,7 +16123,7 @@
           <a:p>
             <a:fld id="{556EC5F8-7B0E-C242-8464-A64B266D24E4}" type="datetimeFigureOut">
               <a:rPr lang="es-MX" smtClean="0"/>
-              <a:t>12/07/23</a:t>
+              <a:t>13/07/23</a:t>
             </a:fld>
             <a:endParaRPr lang="es-MX"/>
           </a:p>
@@ -16161,7 +16165,7 @@
           <a:p>
             <a:fld id="{EEA749B0-890E-8045-9AED-0FC8AF9C7DE4}" type="slidenum">
               <a:rPr lang="es-MX" smtClean="0"/>
-              <a:t>‹Nº›</a:t>
+              <a:t>‹#›</a:t>
             </a:fld>
             <a:endParaRPr lang="es-MX"/>
           </a:p>
@@ -16320,7 +16324,7 @@
           <a:p>
             <a:fld id="{556EC5F8-7B0E-C242-8464-A64B266D24E4}" type="datetimeFigureOut">
               <a:rPr lang="es-MX" smtClean="0"/>
-              <a:t>12/07/23</a:t>
+              <a:t>13/07/23</a:t>
             </a:fld>
             <a:endParaRPr lang="es-MX"/>
           </a:p>
@@ -16362,7 +16366,7 @@
           <a:p>
             <a:fld id="{EEA749B0-890E-8045-9AED-0FC8AF9C7DE4}" type="slidenum">
               <a:rPr lang="es-MX" smtClean="0"/>
-              <a:t>‹Nº›</a:t>
+              <a:t>‹#›</a:t>
             </a:fld>
             <a:endParaRPr lang="es-MX"/>
           </a:p>
@@ -16599,7 +16603,7 @@
           <a:p>
             <a:fld id="{556EC5F8-7B0E-C242-8464-A64B266D24E4}" type="datetimeFigureOut">
               <a:rPr lang="es-MX" smtClean="0"/>
-              <a:t>12/07/23</a:t>
+              <a:t>13/07/23</a:t>
             </a:fld>
             <a:endParaRPr lang="es-MX"/>
           </a:p>
@@ -16641,7 +16645,7 @@
           <a:p>
             <a:fld id="{EEA749B0-890E-8045-9AED-0FC8AF9C7DE4}" type="slidenum">
               <a:rPr lang="es-MX" smtClean="0"/>
-              <a:t>‹Nº›</a:t>
+              <a:t>‹#›</a:t>
             </a:fld>
             <a:endParaRPr lang="es-MX"/>
           </a:p>
@@ -16867,7 +16871,7 @@
           <a:p>
             <a:fld id="{556EC5F8-7B0E-C242-8464-A64B266D24E4}" type="datetimeFigureOut">
               <a:rPr lang="es-MX" smtClean="0"/>
-              <a:t>12/07/23</a:t>
+              <a:t>13/07/23</a:t>
             </a:fld>
             <a:endParaRPr lang="es-MX"/>
           </a:p>
@@ -16909,7 +16913,7 @@
           <a:p>
             <a:fld id="{EEA749B0-890E-8045-9AED-0FC8AF9C7DE4}" type="slidenum">
               <a:rPr lang="es-MX" smtClean="0"/>
-              <a:t>‹Nº›</a:t>
+              <a:t>‹#›</a:t>
             </a:fld>
             <a:endParaRPr lang="es-MX"/>
           </a:p>
@@ -17283,7 +17287,7 @@
           <a:p>
             <a:fld id="{556EC5F8-7B0E-C242-8464-A64B266D24E4}" type="datetimeFigureOut">
               <a:rPr lang="es-MX" smtClean="0"/>
-              <a:t>12/07/23</a:t>
+              <a:t>13/07/23</a:t>
             </a:fld>
             <a:endParaRPr lang="es-MX"/>
           </a:p>
@@ -17325,7 +17329,7 @@
           <a:p>
             <a:fld id="{EEA749B0-890E-8045-9AED-0FC8AF9C7DE4}" type="slidenum">
               <a:rPr lang="es-MX" smtClean="0"/>
-              <a:t>‹Nº›</a:t>
+              <a:t>‹#›</a:t>
             </a:fld>
             <a:endParaRPr lang="es-MX"/>
           </a:p>
@@ -17432,7 +17436,7 @@
           <a:p>
             <a:fld id="{556EC5F8-7B0E-C242-8464-A64B266D24E4}" type="datetimeFigureOut">
               <a:rPr lang="es-MX" smtClean="0"/>
-              <a:t>12/07/23</a:t>
+              <a:t>13/07/23</a:t>
             </a:fld>
             <a:endParaRPr lang="es-MX"/>
           </a:p>
@@ -17474,7 +17478,7 @@
           <a:p>
             <a:fld id="{EEA749B0-890E-8045-9AED-0FC8AF9C7DE4}" type="slidenum">
               <a:rPr lang="es-MX" smtClean="0"/>
-              <a:t>‹Nº›</a:t>
+              <a:t>‹#›</a:t>
             </a:fld>
             <a:endParaRPr lang="es-MX"/>
           </a:p>
@@ -17558,7 +17562,7 @@
           <a:p>
             <a:fld id="{556EC5F8-7B0E-C242-8464-A64B266D24E4}" type="datetimeFigureOut">
               <a:rPr lang="es-MX" smtClean="0"/>
-              <a:t>12/07/23</a:t>
+              <a:t>13/07/23</a:t>
             </a:fld>
             <a:endParaRPr lang="es-MX"/>
           </a:p>
@@ -17600,7 +17604,7 @@
           <a:p>
             <a:fld id="{EEA749B0-890E-8045-9AED-0FC8AF9C7DE4}" type="slidenum">
               <a:rPr lang="es-MX" smtClean="0"/>
-              <a:t>‹Nº›</a:t>
+              <a:t>‹#›</a:t>
             </a:fld>
             <a:endParaRPr lang="es-MX"/>
           </a:p>
@@ -17809,7 +17813,7 @@
           <a:p>
             <a:fld id="{556EC5F8-7B0E-C242-8464-A64B266D24E4}" type="datetimeFigureOut">
               <a:rPr lang="es-MX" smtClean="0"/>
-              <a:t>12/07/23</a:t>
+              <a:t>13/07/23</a:t>
             </a:fld>
             <a:endParaRPr lang="es-MX"/>
           </a:p>
@@ -17851,7 +17855,7 @@
           <a:p>
             <a:fld id="{EEA749B0-890E-8045-9AED-0FC8AF9C7DE4}" type="slidenum">
               <a:rPr lang="es-MX" smtClean="0"/>
-              <a:t>‹Nº›</a:t>
+              <a:t>‹#›</a:t>
             </a:fld>
             <a:endParaRPr lang="es-MX"/>
           </a:p>
@@ -18254,7 +18258,7 @@
           <a:p>
             <a:fld id="{556EC5F8-7B0E-C242-8464-A64B266D24E4}" type="datetimeFigureOut">
               <a:rPr lang="es-MX" smtClean="0"/>
-              <a:t>12/07/23</a:t>
+              <a:t>13/07/23</a:t>
             </a:fld>
             <a:endParaRPr lang="es-MX"/>
           </a:p>
@@ -18301,7 +18305,7 @@
           <a:p>
             <a:fld id="{EEA749B0-890E-8045-9AED-0FC8AF9C7DE4}" type="slidenum">
               <a:rPr lang="es-MX" smtClean="0"/>
-              <a:t>‹Nº›</a:t>
+              <a:t>‹#›</a:t>
             </a:fld>
             <a:endParaRPr lang="es-MX"/>
           </a:p>
@@ -18581,7 +18585,7 @@
           <a:p>
             <a:fld id="{556EC5F8-7B0E-C242-8464-A64B266D24E4}" type="datetimeFigureOut">
               <a:rPr lang="es-MX" smtClean="0"/>
-              <a:t>12/07/23</a:t>
+              <a:t>13/07/23</a:t>
             </a:fld>
             <a:endParaRPr lang="es-MX"/>
           </a:p>
@@ -18657,7 +18661,7 @@
           <a:p>
             <a:fld id="{EEA749B0-890E-8045-9AED-0FC8AF9C7DE4}" type="slidenum">
               <a:rPr lang="es-MX" smtClean="0"/>
-              <a:t>‹Nº›</a:t>
+              <a:t>‹#›</a:t>
             </a:fld>
             <a:endParaRPr lang="es-MX"/>
           </a:p>
@@ -27180,6 +27184,1025 @@
 <file path=ppt/slides/slide25.xml><?xml version="1.0" encoding="utf-8"?>
 <p:sld xmlns:a="http://schemas.openxmlformats.org/drawingml/2006/main" xmlns:r="http://schemas.openxmlformats.org/officeDocument/2006/relationships" xmlns:p="http://schemas.openxmlformats.org/presentationml/2006/main">
   <p:cSld>
+    <p:spTree>
+      <p:nvGrpSpPr>
+        <p:cNvPr id="1" name=""/>
+        <p:cNvGrpSpPr/>
+        <p:nvPr/>
+      </p:nvGrpSpPr>
+      <p:grpSpPr>
+        <a:xfrm>
+          <a:off x="0" y="0"/>
+          <a:ext cx="0" cy="0"/>
+          <a:chOff x="0" y="0"/>
+          <a:chExt cx="0" cy="0"/>
+        </a:xfrm>
+      </p:grpSpPr>
+      <p:sp>
+        <p:nvSpPr>
+          <p:cNvPr id="2" name="Title 1">
+            <a:extLst>
+              <a:ext uri="{FF2B5EF4-FFF2-40B4-BE49-F238E27FC236}">
+                <a16:creationId xmlns:a16="http://schemas.microsoft.com/office/drawing/2014/main" id="{52058B7B-E5AF-2B79-0184-30E0CE0A443E}"/>
+              </a:ext>
+            </a:extLst>
+          </p:cNvPr>
+          <p:cNvSpPr>
+            <a:spLocks noGrp="1"/>
+          </p:cNvSpPr>
+          <p:nvPr>
+            <p:ph type="title"/>
+          </p:nvPr>
+        </p:nvSpPr>
+        <p:spPr/>
+        <p:txBody>
+          <a:bodyPr/>
+          <a:lstStyle/>
+          <a:p>
+            <a:r>
+              <a:rPr lang="en-MX" dirty="0"/>
+              <a:t>How Cypress works?</a:t>
+            </a:r>
+          </a:p>
+        </p:txBody>
+      </p:sp>
+      <p:sp>
+        <p:nvSpPr>
+          <p:cNvPr id="3" name="Content Placeholder 2">
+            <a:extLst>
+              <a:ext uri="{FF2B5EF4-FFF2-40B4-BE49-F238E27FC236}">
+                <a16:creationId xmlns:a16="http://schemas.microsoft.com/office/drawing/2014/main" id="{4D0C885A-DD34-92DB-8776-E77FBB386CDA}"/>
+              </a:ext>
+            </a:extLst>
+          </p:cNvPr>
+          <p:cNvSpPr>
+            <a:spLocks noGrp="1"/>
+          </p:cNvSpPr>
+          <p:nvPr>
+            <p:ph idx="1"/>
+          </p:nvPr>
+        </p:nvSpPr>
+        <p:spPr/>
+        <p:txBody>
+          <a:bodyPr/>
+          <a:lstStyle/>
+          <a:p>
+            <a:r>
+              <a:rPr lang="en-MX" dirty="0"/>
+              <a:t>E2E Testing:</a:t>
+            </a:r>
+          </a:p>
+          <a:p>
+            <a:pPr lvl="1"/>
+            <a:r>
+              <a:rPr lang="en-MX" dirty="0"/>
+              <a:t>Trabaja con la interfaz gráfica de la aplicación</a:t>
+            </a:r>
+          </a:p>
+          <a:p>
+            <a:pPr lvl="1"/>
+            <a:r>
+              <a:rPr lang="en-US" dirty="0"/>
+              <a:t>E</a:t>
+            </a:r>
+            <a:r>
+              <a:rPr lang="en-MX" dirty="0"/>
+              <a:t>s necesario trabajar con el DOM</a:t>
+            </a:r>
+          </a:p>
+          <a:p>
+            <a:r>
+              <a:rPr lang="en-MX" dirty="0"/>
+              <a:t>API Testing:</a:t>
+            </a:r>
+          </a:p>
+          <a:p>
+            <a:pPr lvl="1"/>
+            <a:r>
+              <a:rPr lang="en-MX" dirty="0"/>
+              <a:t>Llamadas a microservicios exitosas</a:t>
+            </a:r>
+          </a:p>
+          <a:p>
+            <a:pPr lvl="1"/>
+            <a:r>
+              <a:rPr lang="en-MX" dirty="0"/>
+              <a:t>Asegurarse de que existen las llaves y/o valores</a:t>
+            </a:r>
+          </a:p>
+        </p:txBody>
+      </p:sp>
+    </p:spTree>
+    <p:extLst>
+      <p:ext uri="{BB962C8B-B14F-4D97-AF65-F5344CB8AC3E}">
+        <p14:creationId xmlns:p14="http://schemas.microsoft.com/office/powerpoint/2010/main" val="2275267597"/>
+      </p:ext>
+    </p:extLst>
+  </p:cSld>
+  <p:clrMapOvr>
+    <a:masterClrMapping/>
+  </p:clrMapOvr>
+  <p:timing>
+    <p:tnLst>
+      <p:par>
+        <p:cTn id="1" dur="indefinite" restart="never" nodeType="tmRoot">
+          <p:childTnLst>
+            <p:seq concurrent="1" nextAc="seek">
+              <p:cTn id="2" dur="indefinite" nodeType="mainSeq">
+                <p:childTnLst>
+                  <p:par>
+                    <p:cTn id="3" fill="hold">
+                      <p:stCondLst>
+                        <p:cond delay="indefinite"/>
+                      </p:stCondLst>
+                      <p:childTnLst>
+                        <p:par>
+                          <p:cTn id="4" fill="hold">
+                            <p:stCondLst>
+                              <p:cond delay="0"/>
+                            </p:stCondLst>
+                            <p:childTnLst>
+                              <p:par>
+                                <p:cTn id="5" presetID="1" presetClass="entr" presetSubtype="0" fill="hold" grpId="0" nodeType="clickEffect">
+                                  <p:stCondLst>
+                                    <p:cond delay="0"/>
+                                  </p:stCondLst>
+                                  <p:childTnLst>
+                                    <p:set>
+                                      <p:cBhvr>
+                                        <p:cTn id="6" dur="1" fill="hold">
+                                          <p:stCondLst>
+                                            <p:cond delay="0"/>
+                                          </p:stCondLst>
+                                        </p:cTn>
+                                        <p:tgtEl>
+                                          <p:spTgt spid="3">
+                                            <p:txEl>
+                                              <p:pRg st="0" end="0"/>
+                                            </p:txEl>
+                                          </p:spTgt>
+                                        </p:tgtEl>
+                                        <p:attrNameLst>
+                                          <p:attrName>style.visibility</p:attrName>
+                                        </p:attrNameLst>
+                                      </p:cBhvr>
+                                      <p:to>
+                                        <p:strVal val="visible"/>
+                                      </p:to>
+                                    </p:set>
+                                  </p:childTnLst>
+                                </p:cTn>
+                              </p:par>
+                              <p:par>
+                                <p:cTn id="7" presetID="1" presetClass="entr" presetSubtype="0" fill="hold" grpId="0" nodeType="withEffect">
+                                  <p:stCondLst>
+                                    <p:cond delay="0"/>
+                                  </p:stCondLst>
+                                  <p:childTnLst>
+                                    <p:set>
+                                      <p:cBhvr>
+                                        <p:cTn id="8" dur="1" fill="hold">
+                                          <p:stCondLst>
+                                            <p:cond delay="0"/>
+                                          </p:stCondLst>
+                                        </p:cTn>
+                                        <p:tgtEl>
+                                          <p:spTgt spid="3">
+                                            <p:txEl>
+                                              <p:pRg st="1" end="1"/>
+                                            </p:txEl>
+                                          </p:spTgt>
+                                        </p:tgtEl>
+                                        <p:attrNameLst>
+                                          <p:attrName>style.visibility</p:attrName>
+                                        </p:attrNameLst>
+                                      </p:cBhvr>
+                                      <p:to>
+                                        <p:strVal val="visible"/>
+                                      </p:to>
+                                    </p:set>
+                                  </p:childTnLst>
+                                </p:cTn>
+                              </p:par>
+                              <p:par>
+                                <p:cTn id="9" presetID="1" presetClass="entr" presetSubtype="0" fill="hold" grpId="0" nodeType="withEffect">
+                                  <p:stCondLst>
+                                    <p:cond delay="0"/>
+                                  </p:stCondLst>
+                                  <p:childTnLst>
+                                    <p:set>
+                                      <p:cBhvr>
+                                        <p:cTn id="10" dur="1" fill="hold">
+                                          <p:stCondLst>
+                                            <p:cond delay="0"/>
+                                          </p:stCondLst>
+                                        </p:cTn>
+                                        <p:tgtEl>
+                                          <p:spTgt spid="3">
+                                            <p:txEl>
+                                              <p:pRg st="2" end="2"/>
+                                            </p:txEl>
+                                          </p:spTgt>
+                                        </p:tgtEl>
+                                        <p:attrNameLst>
+                                          <p:attrName>style.visibility</p:attrName>
+                                        </p:attrNameLst>
+                                      </p:cBhvr>
+                                      <p:to>
+                                        <p:strVal val="visible"/>
+                                      </p:to>
+                                    </p:set>
+                                  </p:childTnLst>
+                                </p:cTn>
+                              </p:par>
+                            </p:childTnLst>
+                          </p:cTn>
+                        </p:par>
+                      </p:childTnLst>
+                    </p:cTn>
+                  </p:par>
+                  <p:par>
+                    <p:cTn id="11" fill="hold">
+                      <p:stCondLst>
+                        <p:cond delay="indefinite"/>
+                      </p:stCondLst>
+                      <p:childTnLst>
+                        <p:par>
+                          <p:cTn id="12" fill="hold">
+                            <p:stCondLst>
+                              <p:cond delay="0"/>
+                            </p:stCondLst>
+                            <p:childTnLst>
+                              <p:par>
+                                <p:cTn id="13" presetID="1" presetClass="entr" presetSubtype="0" fill="hold" grpId="0" nodeType="clickEffect">
+                                  <p:stCondLst>
+                                    <p:cond delay="0"/>
+                                  </p:stCondLst>
+                                  <p:childTnLst>
+                                    <p:set>
+                                      <p:cBhvr>
+                                        <p:cTn id="14" dur="1" fill="hold">
+                                          <p:stCondLst>
+                                            <p:cond delay="0"/>
+                                          </p:stCondLst>
+                                        </p:cTn>
+                                        <p:tgtEl>
+                                          <p:spTgt spid="3">
+                                            <p:txEl>
+                                              <p:pRg st="3" end="3"/>
+                                            </p:txEl>
+                                          </p:spTgt>
+                                        </p:tgtEl>
+                                        <p:attrNameLst>
+                                          <p:attrName>style.visibility</p:attrName>
+                                        </p:attrNameLst>
+                                      </p:cBhvr>
+                                      <p:to>
+                                        <p:strVal val="visible"/>
+                                      </p:to>
+                                    </p:set>
+                                  </p:childTnLst>
+                                </p:cTn>
+                              </p:par>
+                              <p:par>
+                                <p:cTn id="15" presetID="1" presetClass="entr" presetSubtype="0" fill="hold" grpId="0" nodeType="withEffect">
+                                  <p:stCondLst>
+                                    <p:cond delay="0"/>
+                                  </p:stCondLst>
+                                  <p:childTnLst>
+                                    <p:set>
+                                      <p:cBhvr>
+                                        <p:cTn id="16" dur="1" fill="hold">
+                                          <p:stCondLst>
+                                            <p:cond delay="0"/>
+                                          </p:stCondLst>
+                                        </p:cTn>
+                                        <p:tgtEl>
+                                          <p:spTgt spid="3">
+                                            <p:txEl>
+                                              <p:pRg st="4" end="4"/>
+                                            </p:txEl>
+                                          </p:spTgt>
+                                        </p:tgtEl>
+                                        <p:attrNameLst>
+                                          <p:attrName>style.visibility</p:attrName>
+                                        </p:attrNameLst>
+                                      </p:cBhvr>
+                                      <p:to>
+                                        <p:strVal val="visible"/>
+                                      </p:to>
+                                    </p:set>
+                                  </p:childTnLst>
+                                </p:cTn>
+                              </p:par>
+                              <p:par>
+                                <p:cTn id="17" presetID="1" presetClass="entr" presetSubtype="0" fill="hold" grpId="0" nodeType="withEffect">
+                                  <p:stCondLst>
+                                    <p:cond delay="0"/>
+                                  </p:stCondLst>
+                                  <p:childTnLst>
+                                    <p:set>
+                                      <p:cBhvr>
+                                        <p:cTn id="18" dur="1" fill="hold">
+                                          <p:stCondLst>
+                                            <p:cond delay="0"/>
+                                          </p:stCondLst>
+                                        </p:cTn>
+                                        <p:tgtEl>
+                                          <p:spTgt spid="3">
+                                            <p:txEl>
+                                              <p:pRg st="5" end="5"/>
+                                            </p:txEl>
+                                          </p:spTgt>
+                                        </p:tgtEl>
+                                        <p:attrNameLst>
+                                          <p:attrName>style.visibility</p:attrName>
+                                        </p:attrNameLst>
+                                      </p:cBhvr>
+                                      <p:to>
+                                        <p:strVal val="visible"/>
+                                      </p:to>
+                                    </p:set>
+                                  </p:childTnLst>
+                                </p:cTn>
+                              </p:par>
+                            </p:childTnLst>
+                          </p:cTn>
+                        </p:par>
+                      </p:childTnLst>
+                    </p:cTn>
+                  </p:par>
+                </p:childTnLst>
+              </p:cTn>
+              <p:prevCondLst>
+                <p:cond evt="onPrev" delay="0">
+                  <p:tgtEl>
+                    <p:sldTgt/>
+                  </p:tgtEl>
+                </p:cond>
+              </p:prevCondLst>
+              <p:nextCondLst>
+                <p:cond evt="onNext" delay="0">
+                  <p:tgtEl>
+                    <p:sldTgt/>
+                  </p:tgtEl>
+                </p:cond>
+              </p:nextCondLst>
+            </p:seq>
+          </p:childTnLst>
+        </p:cTn>
+      </p:par>
+    </p:tnLst>
+    <p:bldLst>
+      <p:bldP spid="3" grpId="0" build="p"/>
+    </p:bldLst>
+  </p:timing>
+</p:sld>
+</file>
+
+<file path=ppt/slides/slide26.xml><?xml version="1.0" encoding="utf-8"?>
+<p:sld xmlns:a="http://schemas.openxmlformats.org/drawingml/2006/main" xmlns:r="http://schemas.openxmlformats.org/officeDocument/2006/relationships" xmlns:p="http://schemas.openxmlformats.org/presentationml/2006/main">
+  <p:cSld>
+    <p:bg>
+      <p:bgPr>
+        <a:gradFill rotWithShape="1">
+          <a:gsLst>
+            <a:gs pos="0">
+              <a:schemeClr val="bg2">
+                <a:tint val="94000"/>
+                <a:satMod val="80000"/>
+                <a:lumMod val="106000"/>
+              </a:schemeClr>
+            </a:gs>
+            <a:gs pos="100000">
+              <a:schemeClr val="bg2">
+                <a:shade val="80000"/>
+              </a:schemeClr>
+            </a:gs>
+          </a:gsLst>
+          <a:path path="circle">
+            <a:fillToRect l="43000" r="43000" b="100000"/>
+          </a:path>
+        </a:gradFill>
+        <a:effectLst/>
+      </p:bgPr>
+    </p:bg>
+    <p:spTree>
+      <p:nvGrpSpPr>
+        <p:cNvPr id="1" name=""/>
+        <p:cNvGrpSpPr/>
+        <p:nvPr/>
+      </p:nvGrpSpPr>
+      <p:grpSpPr>
+        <a:xfrm>
+          <a:off x="0" y="0"/>
+          <a:ext cx="0" cy="0"/>
+          <a:chOff x="0" y="0"/>
+          <a:chExt cx="0" cy="0"/>
+        </a:xfrm>
+      </p:grpSpPr>
+      <p:sp useBgFill="1">
+        <p:nvSpPr>
+          <p:cNvPr id="10" name="Rectangle 9">
+            <a:extLst>
+              <a:ext uri="{FF2B5EF4-FFF2-40B4-BE49-F238E27FC236}">
+                <a16:creationId xmlns:a16="http://schemas.microsoft.com/office/drawing/2014/main" id="{C630F413-44CE-4746-9821-9E0107978E7A}"/>
+              </a:ext>
+              <a:ext uri="{C183D7F6-B498-43B3-948B-1728B52AA6E4}">
+                <adec:decorative xmlns:adec="http://schemas.microsoft.com/office/drawing/2017/decorative" val="1"/>
+              </a:ext>
+            </a:extLst>
+          </p:cNvPr>
+          <p:cNvSpPr>
+            <a:spLocks noGrp="1" noRot="1" noChangeAspect="1" noMove="1" noResize="1" noEditPoints="1" noAdjustHandles="1" noChangeArrowheads="1" noChangeShapeType="1" noTextEdit="1"/>
+          </p:cNvSpPr>
+          <p:nvPr>
+            <p:extLst>
+              <p:ext uri="{386F3935-93C4-4BCD-93E2-E3B085C9AB24}">
+                <p16:designElem xmlns:p16="http://schemas.microsoft.com/office/powerpoint/2015/main" val="1"/>
+              </p:ext>
+            </p:extLst>
+          </p:nvPr>
+        </p:nvSpPr>
+        <p:spPr>
+          <a:xfrm>
+            <a:off x="2" y="0"/>
+            <a:ext cx="12191695" cy="6858000"/>
+          </a:xfrm>
+          <a:prstGeom prst="rect">
+            <a:avLst/>
+          </a:prstGeom>
+          <a:ln>
+            <a:noFill/>
+          </a:ln>
+        </p:spPr>
+        <p:style>
+          <a:lnRef idx="2">
+            <a:schemeClr val="accent1">
+              <a:shade val="50000"/>
+            </a:schemeClr>
+          </a:lnRef>
+          <a:fillRef idx="1">
+            <a:schemeClr val="accent1"/>
+          </a:fillRef>
+          <a:effectRef idx="0">
+            <a:schemeClr val="accent1"/>
+          </a:effectRef>
+          <a:fontRef idx="minor">
+            <a:schemeClr val="lt1"/>
+          </a:fontRef>
+        </p:style>
+        <p:txBody>
+          <a:bodyPr rtlCol="0" anchor="ctr"/>
+          <a:lstStyle/>
+          <a:p>
+            <a:pPr algn="ctr"/>
+            <a:endParaRPr lang="en-US"/>
+          </a:p>
+        </p:txBody>
+      </p:sp>
+      <p:sp>
+        <p:nvSpPr>
+          <p:cNvPr id="12" name="Rectangle 11">
+            <a:extLst>
+              <a:ext uri="{FF2B5EF4-FFF2-40B4-BE49-F238E27FC236}">
+                <a16:creationId xmlns:a16="http://schemas.microsoft.com/office/drawing/2014/main" id="{22D671B1-B099-4F9C-B9CC-9D22B4DAF8A8}"/>
+              </a:ext>
+              <a:ext uri="{C183D7F6-B498-43B3-948B-1728B52AA6E4}">
+                <adec:decorative xmlns:adec="http://schemas.microsoft.com/office/drawing/2017/decorative" val="1"/>
+              </a:ext>
+            </a:extLst>
+          </p:cNvPr>
+          <p:cNvSpPr>
+            <a:spLocks noGrp="1" noRot="1" noChangeAspect="1" noMove="1" noResize="1" noEditPoints="1" noAdjustHandles="1" noChangeArrowheads="1" noChangeShapeType="1" noTextEdit="1"/>
+          </p:cNvSpPr>
+          <p:nvPr>
+            <p:extLst>
+              <p:ext uri="{386F3935-93C4-4BCD-93E2-E3B085C9AB24}">
+                <p16:designElem xmlns:p16="http://schemas.microsoft.com/office/powerpoint/2015/main" val="1"/>
+              </p:ext>
+            </p:extLst>
+          </p:nvPr>
+        </p:nvSpPr>
+        <p:spPr>
+          <a:xfrm>
+            <a:off x="0" y="2019476"/>
+            <a:ext cx="12192000" cy="4838524"/>
+          </a:xfrm>
+          <a:prstGeom prst="rect">
+            <a:avLst/>
+          </a:prstGeom>
+          <a:gradFill flip="none" rotWithShape="1">
+            <a:gsLst>
+              <a:gs pos="0">
+                <a:schemeClr val="bg2">
+                  <a:alpha val="0"/>
+                </a:schemeClr>
+              </a:gs>
+              <a:gs pos="100000">
+                <a:schemeClr val="bg2"/>
+              </a:gs>
+            </a:gsLst>
+            <a:lin ang="5400000" scaled="0"/>
+            <a:tileRect/>
+          </a:gradFill>
+          <a:ln>
+            <a:noFill/>
+          </a:ln>
+        </p:spPr>
+        <p:style>
+          <a:lnRef idx="2">
+            <a:schemeClr val="accent1">
+              <a:shade val="50000"/>
+            </a:schemeClr>
+          </a:lnRef>
+          <a:fillRef idx="1">
+            <a:schemeClr val="accent1"/>
+          </a:fillRef>
+          <a:effectRef idx="0">
+            <a:schemeClr val="accent1"/>
+          </a:effectRef>
+          <a:fontRef idx="minor">
+            <a:schemeClr val="lt1"/>
+          </a:fontRef>
+        </p:style>
+        <p:txBody>
+          <a:bodyPr rtlCol="0" anchor="ctr"/>
+          <a:lstStyle/>
+          <a:p>
+            <a:pPr lvl="0" algn="ctr"/>
+            <a:endParaRPr lang="en-US"/>
+          </a:p>
+        </p:txBody>
+      </p:sp>
+      <p:sp>
+        <p:nvSpPr>
+          <p:cNvPr id="2" name="Title 1">
+            <a:extLst>
+              <a:ext uri="{FF2B5EF4-FFF2-40B4-BE49-F238E27FC236}">
+                <a16:creationId xmlns:a16="http://schemas.microsoft.com/office/drawing/2014/main" id="{8CDDF346-7996-4436-2E8D-DBBA0686D916}"/>
+              </a:ext>
+            </a:extLst>
+          </p:cNvPr>
+          <p:cNvSpPr>
+            <a:spLocks noGrp="1"/>
+          </p:cNvSpPr>
+          <p:nvPr>
+            <p:ph type="title"/>
+          </p:nvPr>
+        </p:nvSpPr>
+        <p:spPr>
+          <a:xfrm>
+            <a:off x="7555992" y="707475"/>
+            <a:ext cx="3157577" cy="1312001"/>
+          </a:xfrm>
+        </p:spPr>
+        <p:txBody>
+          <a:bodyPr anchor="t">
+            <a:normAutofit/>
+          </a:bodyPr>
+          <a:lstStyle/>
+          <a:p>
+            <a:r>
+              <a:rPr lang="en-MX" sz="2800"/>
+              <a:t>DOM</a:t>
+            </a:r>
+          </a:p>
+        </p:txBody>
+      </p:sp>
+      <p:cxnSp>
+        <p:nvCxnSpPr>
+          <p:cNvPr id="14" name="Straight Connector 13">
+            <a:extLst>
+              <a:ext uri="{FF2B5EF4-FFF2-40B4-BE49-F238E27FC236}">
+                <a16:creationId xmlns:a16="http://schemas.microsoft.com/office/drawing/2014/main" id="{7552FBEF-FA69-427B-8245-0A518E0513D5}"/>
+              </a:ext>
+              <a:ext uri="{C183D7F6-B498-43B3-948B-1728B52AA6E4}">
+                <adec:decorative xmlns:adec="http://schemas.microsoft.com/office/drawing/2017/decorative" val="1"/>
+              </a:ext>
+            </a:extLst>
+          </p:cNvPr>
+          <p:cNvCxnSpPr>
+            <a:cxnSpLocks noGrp="1" noRot="1" noChangeAspect="1" noMove="1" noResize="1" noEditPoints="1" noAdjustHandles="1" noChangeArrowheads="1" noChangeShapeType="1"/>
+          </p:cNvCxnSpPr>
+          <p:nvPr>
+            <p:extLst>
+              <p:ext uri="{386F3935-93C4-4BCD-93E2-E3B085C9AB24}">
+                <p16:designElem xmlns:p16="http://schemas.microsoft.com/office/powerpoint/2015/main" val="1"/>
+              </p:ext>
+            </p:extLst>
+          </p:nvPr>
+        </p:nvCxnSpPr>
+        <p:spPr>
+          <a:xfrm>
+            <a:off x="7555992" y="2146542"/>
+            <a:ext cx="3157578" cy="0"/>
+          </a:xfrm>
+          <a:prstGeom prst="line">
+            <a:avLst/>
+          </a:prstGeom>
+          <a:ln w="31750"/>
+        </p:spPr>
+        <p:style>
+          <a:lnRef idx="3">
+            <a:schemeClr val="accent1"/>
+          </a:lnRef>
+          <a:fillRef idx="0">
+            <a:schemeClr val="accent1"/>
+          </a:fillRef>
+          <a:effectRef idx="2">
+            <a:schemeClr val="accent1"/>
+          </a:effectRef>
+          <a:fontRef idx="minor">
+            <a:schemeClr val="tx1"/>
+          </a:fontRef>
+        </p:style>
+      </p:cxnSp>
+      <p:sp>
+        <p:nvSpPr>
+          <p:cNvPr id="16" name="Title 1">
+            <a:extLst>
+              <a:ext uri="{FF2B5EF4-FFF2-40B4-BE49-F238E27FC236}">
+                <a16:creationId xmlns:a16="http://schemas.microsoft.com/office/drawing/2014/main" id="{898488B7-DBD3-40E7-B54B-4DA6C5693EF3}"/>
+              </a:ext>
+              <a:ext uri="{C183D7F6-B498-43B3-948B-1728B52AA6E4}">
+                <adec:decorative xmlns:adec="http://schemas.microsoft.com/office/drawing/2017/decorative" val="1"/>
+              </a:ext>
+            </a:extLst>
+          </p:cNvPr>
+          <p:cNvSpPr txBox="1">
+            <a:spLocks noGrp="1" noRot="1" noChangeAspect="1" noMove="1" noResize="1" noEditPoints="1" noAdjustHandles="1" noChangeArrowheads="1" noChangeShapeType="1" noTextEdit="1"/>
+          </p:cNvSpPr>
+          <p:nvPr>
+            <p:extLst>
+              <p:ext uri="{386F3935-93C4-4BCD-93E2-E3B085C9AB24}">
+                <p16:designElem xmlns:p16="http://schemas.microsoft.com/office/powerpoint/2015/main" val="1"/>
+              </p:ext>
+            </p:extLst>
+          </p:nvPr>
+        </p:nvSpPr>
+        <p:spPr>
+          <a:xfrm>
+            <a:off x="1451580" y="3122496"/>
+            <a:ext cx="3530157" cy="1049235"/>
+          </a:xfrm>
+          <a:prstGeom prst="rect">
+            <a:avLst/>
+          </a:prstGeom>
+        </p:spPr>
+        <p:txBody>
+          <a:bodyPr vert="horz" lIns="91440" tIns="45720" rIns="91440" bIns="45720" rtlCol="0" anchor="t">
+            <a:normAutofit/>
+          </a:bodyPr>
+          <a:lstStyle>
+            <a:lvl1pPr algn="l" defTabSz="914400" rtl="0" eaLnBrk="1" latinLnBrk="0" hangingPunct="1">
+              <a:lnSpc>
+                <a:spcPct val="90000"/>
+              </a:lnSpc>
+              <a:spcBef>
+                <a:spcPct val="0"/>
+              </a:spcBef>
+              <a:buNone/>
+              <a:defRPr sz="3200" b="0" i="0" kern="1200" cap="all">
+                <a:solidFill>
+                  <a:schemeClr val="tx1"/>
+                </a:solidFill>
+                <a:effectLst/>
+                <a:latin typeface="+mj-lt"/>
+                <a:ea typeface="+mj-ea"/>
+                <a:cs typeface="+mj-cs"/>
+              </a:defRPr>
+            </a:lvl1pPr>
+          </a:lstStyle>
+          <a:p>
+            <a:endParaRPr lang="en-US" dirty="0"/>
+          </a:p>
+        </p:txBody>
+      </p:sp>
+      <p:pic>
+        <p:nvPicPr>
+          <p:cNvPr id="5" name="Picture 4">
+            <a:extLst>
+              <a:ext uri="{FF2B5EF4-FFF2-40B4-BE49-F238E27FC236}">
+                <a16:creationId xmlns:a16="http://schemas.microsoft.com/office/drawing/2014/main" id="{5FC91AF8-EA1B-A066-6408-35DAE709915F}"/>
+              </a:ext>
+            </a:extLst>
+          </p:cNvPr>
+          <p:cNvPicPr>
+            <a:picLocks noChangeAspect="1"/>
+          </p:cNvPicPr>
+          <p:nvPr/>
+        </p:nvPicPr>
+        <p:blipFill>
+          <a:blip r:embed="rId2"/>
+          <a:stretch>
+            <a:fillRect/>
+          </a:stretch>
+        </p:blipFill>
+        <p:spPr>
+          <a:xfrm>
+            <a:off x="1136348" y="904552"/>
+            <a:ext cx="5761020" cy="5112904"/>
+          </a:xfrm>
+          <a:prstGeom prst="rect">
+            <a:avLst/>
+          </a:prstGeom>
+        </p:spPr>
+      </p:pic>
+      <p:sp>
+        <p:nvSpPr>
+          <p:cNvPr id="3" name="Content Placeholder 2">
+            <a:extLst>
+              <a:ext uri="{FF2B5EF4-FFF2-40B4-BE49-F238E27FC236}">
+                <a16:creationId xmlns:a16="http://schemas.microsoft.com/office/drawing/2014/main" id="{994C3A32-4FFA-CB2C-C20B-94A7EAE19286}"/>
+              </a:ext>
+            </a:extLst>
+          </p:cNvPr>
+          <p:cNvSpPr>
+            <a:spLocks noGrp="1"/>
+          </p:cNvSpPr>
+          <p:nvPr>
+            <p:ph idx="1"/>
+          </p:nvPr>
+        </p:nvSpPr>
+        <p:spPr>
+          <a:xfrm>
+            <a:off x="7554137" y="2273608"/>
+            <a:ext cx="4081271" cy="3940925"/>
+          </a:xfrm>
+        </p:spPr>
+        <p:txBody>
+          <a:bodyPr>
+            <a:normAutofit/>
+          </a:bodyPr>
+          <a:lstStyle/>
+          <a:p>
+            <a:r>
+              <a:rPr lang="en-MX" dirty="0"/>
+              <a:t>Document Object Model</a:t>
+            </a:r>
+          </a:p>
+          <a:p>
+            <a:pPr lvl="1"/>
+            <a:r>
+              <a:rPr lang="en-MX" dirty="0"/>
+              <a:t>Página HTML</a:t>
+            </a:r>
+          </a:p>
+          <a:p>
+            <a:pPr lvl="1"/>
+            <a:r>
+              <a:rPr lang="en-MX" dirty="0"/>
+              <a:t>Página estática</a:t>
+            </a:r>
+          </a:p>
+          <a:p>
+            <a:pPr lvl="1"/>
+            <a:endParaRPr lang="en-MX" dirty="0"/>
+          </a:p>
+          <a:p>
+            <a:pPr lvl="1"/>
+            <a:r>
+              <a:rPr lang="en-MX" dirty="0"/>
+              <a:t>Leguanje de programación</a:t>
+            </a:r>
+          </a:p>
+          <a:p>
+            <a:pPr lvl="1"/>
+            <a:r>
+              <a:rPr lang="en-MX" dirty="0"/>
+              <a:t>Página dinámica</a:t>
+            </a:r>
+          </a:p>
+        </p:txBody>
+      </p:sp>
+    </p:spTree>
+    <p:extLst>
+      <p:ext uri="{BB962C8B-B14F-4D97-AF65-F5344CB8AC3E}">
+        <p14:creationId xmlns:p14="http://schemas.microsoft.com/office/powerpoint/2010/main" val="3563581343"/>
+      </p:ext>
+    </p:extLst>
+  </p:cSld>
+  <p:clrMapOvr>
+    <a:masterClrMapping/>
+  </p:clrMapOvr>
+</p:sld>
+</file>
+
+<file path=ppt/slides/slide27.xml><?xml version="1.0" encoding="utf-8"?>
+<p:sld xmlns:a="http://schemas.openxmlformats.org/drawingml/2006/main" xmlns:r="http://schemas.openxmlformats.org/officeDocument/2006/relationships" xmlns:p="http://schemas.openxmlformats.org/presentationml/2006/main">
+  <p:cSld>
+    <p:spTree>
+      <p:nvGrpSpPr>
+        <p:cNvPr id="1" name=""/>
+        <p:cNvGrpSpPr/>
+        <p:nvPr/>
+      </p:nvGrpSpPr>
+      <p:grpSpPr>
+        <a:xfrm>
+          <a:off x="0" y="0"/>
+          <a:ext cx="0" cy="0"/>
+          <a:chOff x="0" y="0"/>
+          <a:chExt cx="0" cy="0"/>
+        </a:xfrm>
+      </p:grpSpPr>
+      <p:sp>
+        <p:nvSpPr>
+          <p:cNvPr id="2" name="Title 1">
+            <a:extLst>
+              <a:ext uri="{FF2B5EF4-FFF2-40B4-BE49-F238E27FC236}">
+                <a16:creationId xmlns:a16="http://schemas.microsoft.com/office/drawing/2014/main" id="{8DC21FE4-728C-2AA3-E030-18BFD45385A7}"/>
+              </a:ext>
+            </a:extLst>
+          </p:cNvPr>
+          <p:cNvSpPr>
+            <a:spLocks noGrp="1"/>
+          </p:cNvSpPr>
+          <p:nvPr>
+            <p:ph type="title"/>
+          </p:nvPr>
+        </p:nvSpPr>
+        <p:spPr/>
+        <p:txBody>
+          <a:bodyPr/>
+          <a:lstStyle/>
+          <a:p>
+            <a:r>
+              <a:rPr lang="en-MX" dirty="0"/>
+              <a:t>Object selection</a:t>
+            </a:r>
+          </a:p>
+        </p:txBody>
+      </p:sp>
+      <p:pic>
+        <p:nvPicPr>
+          <p:cNvPr id="7" name="Content Placeholder 6">
+            <a:extLst>
+              <a:ext uri="{FF2B5EF4-FFF2-40B4-BE49-F238E27FC236}">
+                <a16:creationId xmlns:a16="http://schemas.microsoft.com/office/drawing/2014/main" id="{E90ACEEE-03A0-4218-E0C3-B0CAC06FBFFF}"/>
+              </a:ext>
+            </a:extLst>
+          </p:cNvPr>
+          <p:cNvPicPr>
+            <a:picLocks noGrp="1" noChangeAspect="1"/>
+          </p:cNvPicPr>
+          <p:nvPr>
+            <p:ph idx="1"/>
+          </p:nvPr>
+        </p:nvPicPr>
+        <p:blipFill>
+          <a:blip r:embed="rId2"/>
+          <a:stretch>
+            <a:fillRect/>
+          </a:stretch>
+        </p:blipFill>
+        <p:spPr>
+          <a:xfrm>
+            <a:off x="861754" y="1608427"/>
+            <a:ext cx="10468492" cy="5004246"/>
+          </a:xfrm>
+        </p:spPr>
+      </p:pic>
+    </p:spTree>
+    <p:extLst>
+      <p:ext uri="{BB962C8B-B14F-4D97-AF65-F5344CB8AC3E}">
+        <p14:creationId xmlns:p14="http://schemas.microsoft.com/office/powerpoint/2010/main" val="947752245"/>
+      </p:ext>
+    </p:extLst>
+  </p:cSld>
+  <p:clrMapOvr>
+    <a:masterClrMapping/>
+  </p:clrMapOvr>
+</p:sld>
+</file>
+
+<file path=ppt/slides/slide28.xml><?xml version="1.0" encoding="utf-8"?>
+<p:sld xmlns:a="http://schemas.openxmlformats.org/drawingml/2006/main" xmlns:r="http://schemas.openxmlformats.org/officeDocument/2006/relationships" xmlns:p="http://schemas.openxmlformats.org/presentationml/2006/main">
+  <p:cSld>
+    <p:spTree>
+      <p:nvGrpSpPr>
+        <p:cNvPr id="1" name=""/>
+        <p:cNvGrpSpPr/>
+        <p:nvPr/>
+      </p:nvGrpSpPr>
+      <p:grpSpPr>
+        <a:xfrm>
+          <a:off x="0" y="0"/>
+          <a:ext cx="0" cy="0"/>
+          <a:chOff x="0" y="0"/>
+          <a:chExt cx="0" cy="0"/>
+        </a:xfrm>
+      </p:grpSpPr>
+      <p:sp>
+        <p:nvSpPr>
+          <p:cNvPr id="2" name="Title 1">
+            <a:extLst>
+              <a:ext uri="{FF2B5EF4-FFF2-40B4-BE49-F238E27FC236}">
+                <a16:creationId xmlns:a16="http://schemas.microsoft.com/office/drawing/2014/main" id="{BF1EBE0E-A9F6-DF12-4BCB-D1ECA150145F}"/>
+              </a:ext>
+            </a:extLst>
+          </p:cNvPr>
+          <p:cNvSpPr>
+            <a:spLocks noGrp="1"/>
+          </p:cNvSpPr>
+          <p:nvPr>
+            <p:ph type="title"/>
+          </p:nvPr>
+        </p:nvSpPr>
+        <p:spPr/>
+        <p:txBody>
+          <a:bodyPr/>
+          <a:lstStyle/>
+          <a:p>
+            <a:r>
+              <a:rPr lang="en-MX" dirty="0"/>
+              <a:t>general steps to work with cypress</a:t>
+            </a:r>
+          </a:p>
+        </p:txBody>
+      </p:sp>
+      <p:sp>
+        <p:nvSpPr>
+          <p:cNvPr id="3" name="Content Placeholder 2">
+            <a:extLst>
+              <a:ext uri="{FF2B5EF4-FFF2-40B4-BE49-F238E27FC236}">
+                <a16:creationId xmlns:a16="http://schemas.microsoft.com/office/drawing/2014/main" id="{CBBFFF03-487F-243E-E0C0-A5303BB36FE4}"/>
+              </a:ext>
+            </a:extLst>
+          </p:cNvPr>
+          <p:cNvSpPr>
+            <a:spLocks noGrp="1"/>
+          </p:cNvSpPr>
+          <p:nvPr>
+            <p:ph idx="1"/>
+          </p:nvPr>
+        </p:nvSpPr>
+        <p:spPr/>
+        <p:txBody>
+          <a:bodyPr/>
+          <a:lstStyle/>
+          <a:p>
+            <a:pPr marL="457200" indent="-457200">
+              <a:buFont typeface="+mj-lt"/>
+              <a:buAutoNum type="arabicPeriod"/>
+            </a:pPr>
+            <a:r>
+              <a:rPr lang="en-MX" dirty="0"/>
+              <a:t>Abrir un Navegador de internet</a:t>
+            </a:r>
+          </a:p>
+          <a:p>
+            <a:pPr marL="457200" indent="-457200">
+              <a:buFont typeface="+mj-lt"/>
+              <a:buAutoNum type="arabicPeriod"/>
+            </a:pPr>
+            <a:r>
+              <a:rPr lang="en-MX" dirty="0"/>
+              <a:t>Navegar a la URL </a:t>
+            </a:r>
+          </a:p>
+          <a:p>
+            <a:pPr marL="457200" indent="-457200">
+              <a:buFont typeface="+mj-lt"/>
+              <a:buAutoNum type="arabicPeriod"/>
+            </a:pPr>
+            <a:r>
+              <a:rPr lang="en-MX" dirty="0"/>
+              <a:t>Tomar los objetos de la página o asegurarse que están presentes</a:t>
+            </a:r>
+          </a:p>
+          <a:p>
+            <a:pPr marL="457200" indent="-457200">
+              <a:buFont typeface="+mj-lt"/>
+              <a:buAutoNum type="arabicPeriod"/>
+            </a:pPr>
+            <a:r>
+              <a:rPr lang="en-US" dirty="0"/>
+              <a:t>T</a:t>
+            </a:r>
+            <a:r>
+              <a:rPr lang="en-MX" dirty="0"/>
+              <a:t>rabajar con esos objetos</a:t>
+            </a:r>
+          </a:p>
+        </p:txBody>
+      </p:sp>
+    </p:spTree>
+    <p:extLst>
+      <p:ext uri="{BB962C8B-B14F-4D97-AF65-F5344CB8AC3E}">
+        <p14:creationId xmlns:p14="http://schemas.microsoft.com/office/powerpoint/2010/main" val="3734480553"/>
+      </p:ext>
+    </p:extLst>
+  </p:cSld>
+  <p:clrMapOvr>
+    <a:masterClrMapping/>
+  </p:clrMapOvr>
+</p:sld>
+</file>
+
+<file path=ppt/slides/slide29.xml><?xml version="1.0" encoding="utf-8"?>
+<p:sld xmlns:a="http://schemas.openxmlformats.org/drawingml/2006/main" xmlns:r="http://schemas.openxmlformats.org/officeDocument/2006/relationships" xmlns:p="http://schemas.openxmlformats.org/presentationml/2006/main">
+  <p:cSld>
     <p:bg>
       <p:bgPr>
         <a:gradFill rotWithShape="1">
@@ -27935,7 +28958,101 @@
 </p:sld>
 </file>
 
-<file path=ppt/slides/slide26.xml><?xml version="1.0" encoding="utf-8"?>
+<file path=ppt/slides/slide3.xml><?xml version="1.0" encoding="utf-8"?>
+<p:sld xmlns:a="http://schemas.openxmlformats.org/drawingml/2006/main" xmlns:r="http://schemas.openxmlformats.org/officeDocument/2006/relationships" xmlns:p="http://schemas.openxmlformats.org/presentationml/2006/main">
+  <p:cSld>
+    <p:spTree>
+      <p:nvGrpSpPr>
+        <p:cNvPr id="1" name=""/>
+        <p:cNvGrpSpPr/>
+        <p:nvPr/>
+      </p:nvGrpSpPr>
+      <p:grpSpPr>
+        <a:xfrm>
+          <a:off x="0" y="0"/>
+          <a:ext cx="0" cy="0"/>
+          <a:chOff x="0" y="0"/>
+          <a:chExt cx="0" cy="0"/>
+        </a:xfrm>
+      </p:grpSpPr>
+      <p:sp>
+        <p:nvSpPr>
+          <p:cNvPr id="2" name="Título 1">
+            <a:extLst>
+              <a:ext uri="{FF2B5EF4-FFF2-40B4-BE49-F238E27FC236}">
+                <a16:creationId xmlns:a16="http://schemas.microsoft.com/office/drawing/2014/main" id="{57CE1BF8-32D3-0D46-9077-4E5CB2DB285F}"/>
+              </a:ext>
+            </a:extLst>
+          </p:cNvPr>
+          <p:cNvSpPr>
+            <a:spLocks noGrp="1"/>
+          </p:cNvSpPr>
+          <p:nvPr>
+            <p:ph type="title"/>
+          </p:nvPr>
+        </p:nvSpPr>
+        <p:spPr/>
+        <p:txBody>
+          <a:bodyPr/>
+          <a:lstStyle/>
+          <a:p>
+            <a:r>
+              <a:rPr lang="es-MX" dirty="0"/>
+              <a:t>Henry Ford (1863 – 1947)</a:t>
+            </a:r>
+          </a:p>
+        </p:txBody>
+      </p:sp>
+      <p:sp>
+        <p:nvSpPr>
+          <p:cNvPr id="3" name="Marcador de contenido 2">
+            <a:extLst>
+              <a:ext uri="{FF2B5EF4-FFF2-40B4-BE49-F238E27FC236}">
+                <a16:creationId xmlns:a16="http://schemas.microsoft.com/office/drawing/2014/main" id="{383AC3F2-476A-A445-9554-5442FC5CC310}"/>
+              </a:ext>
+            </a:extLst>
+          </p:cNvPr>
+          <p:cNvSpPr>
+            <a:spLocks noGrp="1"/>
+          </p:cNvSpPr>
+          <p:nvPr>
+            <p:ph idx="1"/>
+          </p:nvPr>
+        </p:nvSpPr>
+        <p:spPr>
+          <a:xfrm>
+            <a:off x="670932" y="2374899"/>
+            <a:ext cx="10515600" cy="3344863"/>
+          </a:xfrm>
+        </p:spPr>
+        <p:txBody>
+          <a:bodyPr>
+            <a:normAutofit/>
+          </a:bodyPr>
+          <a:lstStyle/>
+          <a:p>
+            <a:pPr algn="ctr"/>
+            <a:r>
+              <a:rPr lang="es-MX" sz="5400" dirty="0"/>
+              <a:t>“Hacer las cosas bien incluso cuando nadie te está mirando”</a:t>
+            </a:r>
+          </a:p>
+        </p:txBody>
+      </p:sp>
+    </p:spTree>
+    <p:extLst>
+      <p:ext uri="{BB962C8B-B14F-4D97-AF65-F5344CB8AC3E}">
+        <p14:creationId xmlns:p14="http://schemas.microsoft.com/office/powerpoint/2010/main" val="3341520147"/>
+      </p:ext>
+    </p:extLst>
+  </p:cSld>
+  <p:clrMapOvr>
+    <a:masterClrMapping/>
+  </p:clrMapOvr>
+</p:sld>
+</file>
+
+<file path=ppt/slides/slide30.xml><?xml version="1.0" encoding="utf-8"?>
 <p:sld xmlns:a="http://schemas.openxmlformats.org/drawingml/2006/main" xmlns:r="http://schemas.openxmlformats.org/officeDocument/2006/relationships" xmlns:p="http://schemas.openxmlformats.org/presentationml/2006/main">
   <p:cSld>
     <p:spTree>
@@ -28059,100 +29176,6 @@
     <p:extLst>
       <p:ext uri="{BB962C8B-B14F-4D97-AF65-F5344CB8AC3E}">
         <p14:creationId xmlns:p14="http://schemas.microsoft.com/office/powerpoint/2010/main" val="2158317005"/>
-      </p:ext>
-    </p:extLst>
-  </p:cSld>
-  <p:clrMapOvr>
-    <a:masterClrMapping/>
-  </p:clrMapOvr>
-</p:sld>
-</file>
-
-<file path=ppt/slides/slide3.xml><?xml version="1.0" encoding="utf-8"?>
-<p:sld xmlns:a="http://schemas.openxmlformats.org/drawingml/2006/main" xmlns:r="http://schemas.openxmlformats.org/officeDocument/2006/relationships" xmlns:p="http://schemas.openxmlformats.org/presentationml/2006/main">
-  <p:cSld>
-    <p:spTree>
-      <p:nvGrpSpPr>
-        <p:cNvPr id="1" name=""/>
-        <p:cNvGrpSpPr/>
-        <p:nvPr/>
-      </p:nvGrpSpPr>
-      <p:grpSpPr>
-        <a:xfrm>
-          <a:off x="0" y="0"/>
-          <a:ext cx="0" cy="0"/>
-          <a:chOff x="0" y="0"/>
-          <a:chExt cx="0" cy="0"/>
-        </a:xfrm>
-      </p:grpSpPr>
-      <p:sp>
-        <p:nvSpPr>
-          <p:cNvPr id="2" name="Título 1">
-            <a:extLst>
-              <a:ext uri="{FF2B5EF4-FFF2-40B4-BE49-F238E27FC236}">
-                <a16:creationId xmlns:a16="http://schemas.microsoft.com/office/drawing/2014/main" id="{57CE1BF8-32D3-0D46-9077-4E5CB2DB285F}"/>
-              </a:ext>
-            </a:extLst>
-          </p:cNvPr>
-          <p:cNvSpPr>
-            <a:spLocks noGrp="1"/>
-          </p:cNvSpPr>
-          <p:nvPr>
-            <p:ph type="title"/>
-          </p:nvPr>
-        </p:nvSpPr>
-        <p:spPr/>
-        <p:txBody>
-          <a:bodyPr/>
-          <a:lstStyle/>
-          <a:p>
-            <a:r>
-              <a:rPr lang="es-MX" dirty="0"/>
-              <a:t>Henry Ford (1863 – 1947)</a:t>
-            </a:r>
-          </a:p>
-        </p:txBody>
-      </p:sp>
-      <p:sp>
-        <p:nvSpPr>
-          <p:cNvPr id="3" name="Marcador de contenido 2">
-            <a:extLst>
-              <a:ext uri="{FF2B5EF4-FFF2-40B4-BE49-F238E27FC236}">
-                <a16:creationId xmlns:a16="http://schemas.microsoft.com/office/drawing/2014/main" id="{383AC3F2-476A-A445-9554-5442FC5CC310}"/>
-              </a:ext>
-            </a:extLst>
-          </p:cNvPr>
-          <p:cNvSpPr>
-            <a:spLocks noGrp="1"/>
-          </p:cNvSpPr>
-          <p:nvPr>
-            <p:ph idx="1"/>
-          </p:nvPr>
-        </p:nvSpPr>
-        <p:spPr>
-          <a:xfrm>
-            <a:off x="670932" y="2374899"/>
-            <a:ext cx="10515600" cy="3344863"/>
-          </a:xfrm>
-        </p:spPr>
-        <p:txBody>
-          <a:bodyPr>
-            <a:normAutofit/>
-          </a:bodyPr>
-          <a:lstStyle/>
-          <a:p>
-            <a:pPr algn="ctr"/>
-            <a:r>
-              <a:rPr lang="es-MX" sz="5400" dirty="0"/>
-              <a:t>“Hacer las cosas bien incluso cuando nadie te está mirando”</a:t>
-            </a:r>
-          </a:p>
-        </p:txBody>
-      </p:sp>
-    </p:spTree>
-    <p:extLst>
-      <p:ext uri="{BB962C8B-B14F-4D97-AF65-F5344CB8AC3E}">
-        <p14:creationId xmlns:p14="http://schemas.microsoft.com/office/powerpoint/2010/main" val="3341520147"/>
       </p:ext>
     </p:extLst>
   </p:cSld>

</xml_diff>